<commit_message>
First Pass at CHapter 7. Updated instructions on chapter 6
</commit_message>
<xml_diff>
--- a/Trunk/Getting Started Material/DCAF Training/6 Static Modules.pptx
+++ b/Trunk/Getting Started Material/DCAF Training/6 Static Modules.pptx
@@ -5,7 +5,7 @@
     <p:sldMasterId id="2147483741" r:id="rId1"/>
   </p:sldMasterIdLst>
   <p:notesMasterIdLst>
-    <p:notesMasterId r:id="rId24"/>
+    <p:notesMasterId r:id="rId28"/>
   </p:notesMasterIdLst>
   <p:sldIdLst>
     <p:sldId id="259" r:id="rId2"/>
@@ -20,16 +20,20 @@
     <p:sldId id="402" r:id="rId11"/>
     <p:sldId id="398" r:id="rId12"/>
     <p:sldId id="399" r:id="rId13"/>
-    <p:sldId id="406" r:id="rId14"/>
-    <p:sldId id="407" r:id="rId15"/>
-    <p:sldId id="412" r:id="rId16"/>
-    <p:sldId id="400" r:id="rId17"/>
-    <p:sldId id="394" r:id="rId18"/>
-    <p:sldId id="414" r:id="rId19"/>
-    <p:sldId id="409" r:id="rId20"/>
-    <p:sldId id="408" r:id="rId21"/>
-    <p:sldId id="410" r:id="rId22"/>
-    <p:sldId id="411" r:id="rId23"/>
+    <p:sldId id="423" r:id="rId14"/>
+    <p:sldId id="406" r:id="rId15"/>
+    <p:sldId id="407" r:id="rId16"/>
+    <p:sldId id="412" r:id="rId17"/>
+    <p:sldId id="400" r:id="rId18"/>
+    <p:sldId id="421" r:id="rId19"/>
+    <p:sldId id="394" r:id="rId20"/>
+    <p:sldId id="414" r:id="rId21"/>
+    <p:sldId id="409" r:id="rId22"/>
+    <p:sldId id="408" r:id="rId23"/>
+    <p:sldId id="418" r:id="rId24"/>
+    <p:sldId id="410" r:id="rId25"/>
+    <p:sldId id="420" r:id="rId26"/>
+    <p:sldId id="411" r:id="rId27"/>
   </p:sldIdLst>
   <p:sldSz cx="12192000" cy="6858000"/>
   <p:notesSz cx="6858000" cy="9144000"/>
@@ -941,7 +945,7 @@
         <a:bodyPr/>
         <a:lstStyle/>
         <a:p>
-          <a:endParaRPr lang="en-US"/>
+          <a:endParaRPr lang="en-US" dirty="0"/>
         </a:p>
       </dgm:t>
     </dgm:pt>
@@ -977,7 +981,7 @@
         <a:bodyPr/>
         <a:lstStyle/>
         <a:p>
-          <a:endParaRPr lang="en-US"/>
+          <a:endParaRPr lang="en-US" dirty="0"/>
         </a:p>
       </dgm:t>
     </dgm:pt>
@@ -1013,7 +1017,7 @@
         <a:bodyPr/>
         <a:lstStyle/>
         <a:p>
-          <a:endParaRPr lang="en-US"/>
+          <a:endParaRPr lang="en-US" dirty="0"/>
         </a:p>
       </dgm:t>
     </dgm:pt>
@@ -1257,7 +1261,7 @@
             </a:spcAft>
             <a:buNone/>
           </a:pPr>
-          <a:endParaRPr lang="en-US" sz="1800" kern="1200"/>
+          <a:endParaRPr lang="en-US" sz="1800" kern="1200" dirty="0"/>
         </a:p>
       </dsp:txBody>
       <dsp:txXfrm>
@@ -1405,7 +1409,7 @@
             </a:spcAft>
             <a:buNone/>
           </a:pPr>
-          <a:endParaRPr lang="en-US" sz="1800" kern="1200"/>
+          <a:endParaRPr lang="en-US" sz="1800" kern="1200" dirty="0"/>
         </a:p>
       </dsp:txBody>
       <dsp:txXfrm rot="10800000">
@@ -1553,7 +1557,7 @@
             </a:spcAft>
             <a:buNone/>
           </a:pPr>
-          <a:endParaRPr lang="en-US" sz="1800" kern="1200"/>
+          <a:endParaRPr lang="en-US" sz="1800" kern="1200" dirty="0"/>
         </a:p>
       </dsp:txBody>
       <dsp:txXfrm>
@@ -2859,7 +2863,7 @@
             </a:lvl1pPr>
           </a:lstStyle>
           <a:p>
-            <a:endParaRPr lang="en-US"/>
+            <a:endParaRPr lang="en-US" dirty="0"/>
           </a:p>
         </p:txBody>
       </p:sp>
@@ -2892,9 +2896,9 @@
           <a:p>
             <a:fld id="{EA1FD1DD-1EDF-4341-AE12-9015BA74AB77}" type="datetimeFigureOut">
               <a:rPr lang="en-US" smtClean="0"/>
-              <a:t>7/6/2018</a:t>
+              <a:t>7/9/2018</a:t>
             </a:fld>
-            <a:endParaRPr lang="en-US"/>
+            <a:endParaRPr lang="en-US" dirty="0"/>
           </a:p>
         </p:txBody>
       </p:sp>
@@ -2927,7 +2931,7 @@
           <a:bodyPr vert="horz" lIns="91440" tIns="45720" rIns="91440" bIns="45720" rtlCol="0" anchor="ctr"/>
           <a:lstStyle/>
           <a:p>
-            <a:endParaRPr lang="en-US"/>
+            <a:endParaRPr lang="en-US" dirty="0"/>
           </a:p>
         </p:txBody>
       </p:sp>
@@ -3017,7 +3021,7 @@
             </a:lvl1pPr>
           </a:lstStyle>
           <a:p>
-            <a:endParaRPr lang="en-US"/>
+            <a:endParaRPr lang="en-US" dirty="0"/>
           </a:p>
         </p:txBody>
       </p:sp>
@@ -3052,7 +3056,7 @@
               <a:rPr lang="en-US" smtClean="0"/>
               <a:t>‹#›</a:t>
             </a:fld>
-            <a:endParaRPr lang="en-US"/>
+            <a:endParaRPr lang="en-US" dirty="0"/>
           </a:p>
         </p:txBody>
       </p:sp>
@@ -3226,7 +3230,7 @@
               <a:rPr lang="en-US" smtClean="0"/>
               <a:t>7</a:t>
             </a:fld>
-            <a:endParaRPr lang="en-US"/>
+            <a:endParaRPr lang="en-US" dirty="0"/>
           </a:p>
         </p:txBody>
       </p:sp>
@@ -3310,7 +3314,7 @@
               <a:rPr lang="en-US" smtClean="0"/>
               <a:t>9</a:t>
             </a:fld>
-            <a:endParaRPr lang="en-US"/>
+            <a:endParaRPr lang="en-US" dirty="0"/>
           </a:p>
         </p:txBody>
       </p:sp>
@@ -3394,7 +3398,7 @@
               <a:rPr lang="en-US" smtClean="0"/>
               <a:t>10</a:t>
             </a:fld>
-            <a:endParaRPr lang="en-US"/>
+            <a:endParaRPr lang="en-US" dirty="0"/>
           </a:p>
         </p:txBody>
       </p:sp>
@@ -3479,9 +3483,9 @@
           <a:p>
             <a:fld id="{6181AA9A-826B-4D28-AD84-6800691176DC}" type="slidenum">
               <a:rPr lang="en-US" smtClean="0"/>
-              <a:t>21</a:t>
+              <a:t>24</a:t>
             </a:fld>
-            <a:endParaRPr lang="en-US"/>
+            <a:endParaRPr lang="en-US" dirty="0"/>
           </a:p>
         </p:txBody>
       </p:sp>
@@ -3556,7 +3560,7 @@
           <a:lstStyle/>
           <a:p>
             <a:pPr algn="ctr"/>
-            <a:endParaRPr lang="en-US" sz="2400"/>
+            <a:endParaRPr lang="en-US" sz="2400" dirty="0"/>
           </a:p>
         </p:txBody>
       </p:sp>
@@ -3672,7 +3676,7 @@
           <a:lstStyle/>
           <a:p>
             <a:pPr algn="ctr"/>
-            <a:endParaRPr lang="en-US" sz="2400"/>
+            <a:endParaRPr lang="en-US" sz="2400" dirty="0"/>
           </a:p>
         </p:txBody>
       </p:sp>
@@ -3832,13 +3836,8 @@
             </a:br>
             <a:r>
               <a:rPr lang="en-US" dirty="0"/>
-              <a:t>Use minimum height 1690 </a:t>
-            </a:r>
-            <a:r>
-              <a:rPr lang="en-US" dirty="0" err="1"/>
-              <a:t>px</a:t>
-            </a:r>
-            <a:endParaRPr lang="en-US" dirty="0"/>
+              <a:t>Use minimum height 1690 px</a:t>
+            </a:r>
           </a:p>
         </p:txBody>
       </p:sp>
@@ -3954,7 +3953,7 @@
           <a:lstStyle/>
           <a:p>
             <a:pPr algn="ctr"/>
-            <a:endParaRPr lang="en-US" sz="2400"/>
+            <a:endParaRPr lang="en-US" sz="2400" dirty="0"/>
           </a:p>
         </p:txBody>
       </p:sp>
@@ -4116,13 +4115,8 @@
             </a:br>
             <a:r>
               <a:rPr lang="en-US" dirty="0"/>
-              <a:t>Use minimum height 1690 </a:t>
-            </a:r>
-            <a:r>
-              <a:rPr lang="en-US" dirty="0" err="1"/>
-              <a:t>px</a:t>
-            </a:r>
-            <a:endParaRPr lang="en-US" dirty="0"/>
+              <a:t>Use minimum height 1690 px</a:t>
+            </a:r>
           </a:p>
         </p:txBody>
       </p:sp>
@@ -4238,7 +4232,7 @@
           <a:lstStyle/>
           <a:p>
             <a:pPr algn="ctr"/>
-            <a:endParaRPr lang="en-US" sz="2400"/>
+            <a:endParaRPr lang="en-US" sz="2400" dirty="0"/>
           </a:p>
         </p:txBody>
       </p:sp>
@@ -4423,13 +4417,8 @@
             </a:br>
             <a:r>
               <a:rPr lang="en-US" dirty="0"/>
-              <a:t>Use minimum height 1690 </a:t>
-            </a:r>
-            <a:r>
-              <a:rPr lang="en-US" dirty="0" err="1"/>
-              <a:t>px</a:t>
-            </a:r>
-            <a:endParaRPr lang="en-US" dirty="0"/>
+              <a:t>Use minimum height 1690 px</a:t>
+            </a:r>
           </a:p>
         </p:txBody>
       </p:sp>
@@ -4545,7 +4534,7 @@
           <a:lstStyle/>
           <a:p>
             <a:pPr algn="ctr"/>
-            <a:endParaRPr lang="en-US" sz="2400"/>
+            <a:endParaRPr lang="en-US" sz="2400" dirty="0"/>
           </a:p>
         </p:txBody>
       </p:sp>
@@ -4702,13 +4691,8 @@
             </a:br>
             <a:r>
               <a:rPr lang="en-US" dirty="0"/>
-              <a:t>Use minimum height 1690 </a:t>
-            </a:r>
-            <a:r>
-              <a:rPr lang="en-US" dirty="0" err="1"/>
-              <a:t>px</a:t>
-            </a:r>
-            <a:endParaRPr lang="en-US" dirty="0"/>
+              <a:t>Use minimum height 1690 px</a:t>
+            </a:r>
           </a:p>
         </p:txBody>
       </p:sp>
@@ -4824,7 +4808,7 @@
           <a:lstStyle/>
           <a:p>
             <a:pPr algn="ctr"/>
-            <a:endParaRPr lang="en-US" sz="2400"/>
+            <a:endParaRPr lang="en-US" sz="2400" dirty="0"/>
           </a:p>
         </p:txBody>
       </p:sp>
@@ -4976,13 +4960,8 @@
             </a:pPr>
             <a:r>
               <a:rPr lang="en-US" dirty="0"/>
-              <a:t>Drag or insert image here. Use minimum width 1500 </a:t>
-            </a:r>
-            <a:r>
-              <a:rPr lang="en-US" dirty="0" err="1"/>
-              <a:t>px</a:t>
-            </a:r>
-            <a:endParaRPr lang="en-US" dirty="0"/>
+              <a:t>Drag or insert image here. Use minimum width 1500 px</a:t>
+            </a:r>
           </a:p>
         </p:txBody>
       </p:sp>
@@ -5146,7 +5125,7 @@
           <a:lstStyle/>
           <a:p>
             <a:pPr algn="ctr"/>
-            <a:endParaRPr lang="en-US" sz="2400"/>
+            <a:endParaRPr lang="en-US" sz="2400" dirty="0"/>
           </a:p>
         </p:txBody>
       </p:sp>
@@ -5412,7 +5391,7 @@
           <a:lstStyle/>
           <a:p>
             <a:pPr algn="ctr"/>
-            <a:endParaRPr lang="en-US" sz="2400"/>
+            <a:endParaRPr lang="en-US" sz="2400" dirty="0"/>
           </a:p>
         </p:txBody>
       </p:sp>
@@ -5812,18 +5791,13 @@
           </a:lstStyle>
           <a:p>
             <a:r>
-              <a:rPr lang="en-US" sz="1333" dirty="0" err="1">
+              <a:rPr lang="en-US" sz="1333" dirty="0">
                 <a:solidFill>
                   <a:schemeClr val="bg1"/>
                 </a:solidFill>
               </a:rPr>
               <a:t>ni.com</a:t>
             </a:r>
-            <a:endParaRPr lang="en-US" sz="1333" dirty="0">
-              <a:solidFill>
-                <a:schemeClr val="bg1"/>
-              </a:solidFill>
-            </a:endParaRPr>
           </a:p>
         </p:txBody>
       </p:sp>
@@ -5898,7 +5872,7 @@
           <a:lstStyle/>
           <a:p>
             <a:pPr algn="ctr"/>
-            <a:endParaRPr lang="en-US" sz="2400"/>
+            <a:endParaRPr lang="en-US" sz="2400" dirty="0"/>
           </a:p>
         </p:txBody>
       </p:sp>
@@ -6164,18 +6138,13 @@
           </a:lstStyle>
           <a:p>
             <a:r>
-              <a:rPr lang="en-US" sz="1333" dirty="0" err="1">
+              <a:rPr lang="en-US" sz="1333" dirty="0">
                 <a:solidFill>
                   <a:schemeClr val="bg1"/>
                 </a:solidFill>
               </a:rPr>
               <a:t>ni.com</a:t>
             </a:r>
-            <a:endParaRPr lang="en-US" sz="1333" dirty="0">
-              <a:solidFill>
-                <a:schemeClr val="bg1"/>
-              </a:solidFill>
-            </a:endParaRPr>
           </a:p>
         </p:txBody>
       </p:sp>
@@ -6261,7 +6230,7 @@
           <a:lstStyle/>
           <a:p>
             <a:pPr algn="ctr"/>
-            <a:endParaRPr lang="en-US" sz="2400"/>
+            <a:endParaRPr lang="en-US" sz="2400" dirty="0"/>
           </a:p>
         </p:txBody>
       </p:sp>
@@ -6487,18 +6456,13 @@
           </a:lstStyle>
           <a:p>
             <a:r>
-              <a:rPr lang="en-US" sz="1333" dirty="0" err="1">
+              <a:rPr lang="en-US" sz="1333" dirty="0">
                 <a:solidFill>
                   <a:schemeClr val="bg1"/>
                 </a:solidFill>
               </a:rPr>
               <a:t>ni.com</a:t>
             </a:r>
-            <a:endParaRPr lang="en-US" sz="1333" dirty="0">
-              <a:solidFill>
-                <a:schemeClr val="bg1"/>
-              </a:solidFill>
-            </a:endParaRPr>
           </a:p>
         </p:txBody>
       </p:sp>
@@ -6651,9 +6615,9 @@
           <a:p>
             <a:fld id="{C328AB28-8CF8-4FDA-851D-B8A8B08C8597}" type="datetimeFigureOut">
               <a:rPr lang="en-US" smtClean="0"/>
-              <a:t>7/6/2018</a:t>
+              <a:t>7/9/2018</a:t>
             </a:fld>
-            <a:endParaRPr lang="en-US"/>
+            <a:endParaRPr lang="en-US" dirty="0"/>
           </a:p>
         </p:txBody>
       </p:sp>
@@ -6678,7 +6642,7 @@
           <a:bodyPr/>
           <a:lstStyle/>
           <a:p>
-            <a:endParaRPr lang="en-US"/>
+            <a:endParaRPr lang="en-US" dirty="0"/>
           </a:p>
         </p:txBody>
       </p:sp>
@@ -6707,7 +6671,7 @@
               <a:rPr lang="en-US" smtClean="0"/>
               <a:t>‹#›</a:t>
             </a:fld>
-            <a:endParaRPr lang="en-US"/>
+            <a:endParaRPr lang="en-US" dirty="0"/>
           </a:p>
         </p:txBody>
       </p:sp>
@@ -6790,7 +6754,7 @@
           <a:lstStyle/>
           <a:p>
             <a:pPr algn="ctr"/>
-            <a:endParaRPr lang="en-US" sz="2400"/>
+            <a:endParaRPr lang="en-US" sz="2400" dirty="0"/>
           </a:p>
         </p:txBody>
       </p:sp>
@@ -7203,10 +7167,9 @@
           </a:lstStyle>
           <a:p>
             <a:r>
-              <a:rPr lang="en-US" sz="1333" dirty="0" err="1"/>
+              <a:rPr lang="en-US" sz="1333" dirty="0"/>
               <a:t>ni.com</a:t>
             </a:r>
-            <a:endParaRPr lang="en-US" sz="1333" dirty="0"/>
           </a:p>
         </p:txBody>
       </p:sp>
@@ -7289,7 +7252,7 @@
           <a:lstStyle/>
           <a:p>
             <a:pPr algn="ctr"/>
-            <a:endParaRPr lang="en-US" sz="2400"/>
+            <a:endParaRPr lang="en-US" sz="2400" dirty="0"/>
           </a:p>
         </p:txBody>
       </p:sp>
@@ -7621,10 +7584,9 @@
           </a:lstStyle>
           <a:p>
             <a:r>
-              <a:rPr lang="en-US" sz="1333" dirty="0" err="1"/>
+              <a:rPr lang="en-US" sz="1333" dirty="0"/>
               <a:t>ni.com</a:t>
             </a:r>
-            <a:endParaRPr lang="en-US" sz="1333" dirty="0"/>
           </a:p>
         </p:txBody>
       </p:sp>
@@ -7815,7 +7777,7 @@
           <a:lstStyle/>
           <a:p>
             <a:pPr algn="ctr"/>
-            <a:endParaRPr lang="en-US" sz="2400"/>
+            <a:endParaRPr lang="en-US" sz="2400" dirty="0"/>
           </a:p>
         </p:txBody>
       </p:sp>
@@ -8069,7 +8031,7 @@
           <a:lstStyle/>
           <a:p>
             <a:pPr algn="ctr"/>
-            <a:endParaRPr lang="en-US" sz="2400"/>
+            <a:endParaRPr lang="en-US" sz="2400" dirty="0"/>
           </a:p>
         </p:txBody>
       </p:sp>
@@ -8306,7 +8268,7 @@
           <a:lstStyle/>
           <a:p>
             <a:pPr algn="ctr"/>
-            <a:endParaRPr lang="en-US" sz="2400"/>
+            <a:endParaRPr lang="en-US" sz="2400" dirty="0"/>
           </a:p>
         </p:txBody>
       </p:sp>
@@ -8616,7 +8578,7 @@
           <a:lstStyle/>
           <a:p>
             <a:pPr algn="ctr"/>
-            <a:endParaRPr lang="en-US" sz="2400"/>
+            <a:endParaRPr lang="en-US" sz="2400" dirty="0"/>
           </a:p>
         </p:txBody>
       </p:sp>
@@ -9008,7 +8970,7 @@
           <a:lstStyle/>
           <a:p>
             <a:pPr algn="ctr"/>
-            <a:endParaRPr lang="en-US" sz="2400"/>
+            <a:endParaRPr lang="en-US" sz="2400" dirty="0"/>
           </a:p>
         </p:txBody>
       </p:sp>
@@ -9178,13 +9140,8 @@
             </a:br>
             <a:r>
               <a:rPr lang="en-US" dirty="0"/>
-              <a:t>Use minimum height 1690 </a:t>
-            </a:r>
-            <a:r>
-              <a:rPr lang="en-US" dirty="0" err="1"/>
-              <a:t>px</a:t>
-            </a:r>
-            <a:endParaRPr lang="en-US" dirty="0"/>
+              <a:t>Use minimum height 1690 px</a:t>
+            </a:r>
           </a:p>
         </p:txBody>
       </p:sp>
@@ -9422,7 +9379,7 @@
           <a:lstStyle/>
           <a:p>
             <a:pPr algn="ctr"/>
-            <a:endParaRPr lang="en-US" sz="2400">
+            <a:endParaRPr lang="en-US" sz="2400" dirty="0">
               <a:latin typeface="+mn-lt"/>
             </a:endParaRPr>
           </a:p>
@@ -9903,15 +9860,7 @@
           <a:p>
             <a:r>
               <a:rPr lang="en-US" dirty="0"/>
-              <a:t>Benjamin </a:t>
-            </a:r>
-            <a:r>
-              <a:rPr lang="en-US" dirty="0" err="1"/>
-              <a:t>Celis</a:t>
-            </a:r>
-            <a:r>
-              <a:rPr lang="en-US" dirty="0"/>
-              <a:t>, Mathew Pollock, Simon Perez</a:t>
+              <a:t>Benjamin Celis, Simon Perez</a:t>
             </a:r>
           </a:p>
         </p:txBody>
@@ -10423,7 +10372,7 @@
                     <a:bodyPr/>
                     <a:lstStyle/>
                     <a:p>
-                      <a:endParaRPr lang="en-US"/>
+                      <a:endParaRPr lang="en-US" dirty="0"/>
                     </a:p>
                   </a:txBody>
                   <a:tcPr/>
@@ -10460,7 +10409,7 @@
                     <a:bodyPr/>
                     <a:lstStyle/>
                     <a:p>
-                      <a:endParaRPr lang="en-US"/>
+                      <a:endParaRPr lang="en-US" dirty="0"/>
                     </a:p>
                   </a:txBody>
                   <a:tcPr/>
@@ -10591,6 +10540,127 @@
       </p:grpSpPr>
       <p:sp>
         <p:nvSpPr>
+          <p:cNvPr id="2" name="Title 1">
+            <a:extLst>
+              <a:ext uri="{FF2B5EF4-FFF2-40B4-BE49-F238E27FC236}">
+                <a16:creationId xmlns:a16="http://schemas.microsoft.com/office/drawing/2014/main" id="{F77F9243-7F60-48A5-8580-6BC70CC45E94}"/>
+              </a:ext>
+            </a:extLst>
+          </p:cNvPr>
+          <p:cNvSpPr>
+            <a:spLocks noGrp="1"/>
+          </p:cNvSpPr>
+          <p:nvPr>
+            <p:ph type="title"/>
+          </p:nvPr>
+        </p:nvSpPr>
+        <p:spPr>
+          <a:xfrm>
+            <a:off x="605367" y="365760"/>
+            <a:ext cx="10972800" cy="609600"/>
+          </a:xfrm>
+        </p:spPr>
+        <p:txBody>
+          <a:bodyPr/>
+          <a:lstStyle/>
+          <a:p>
+            <a:r>
+              <a:rPr lang="en-US" dirty="0"/>
+              <a:t>Exercise 1: Custom PID</a:t>
+            </a:r>
+          </a:p>
+        </p:txBody>
+      </p:sp>
+      <p:sp>
+        <p:nvSpPr>
+          <p:cNvPr id="3" name="Content Placeholder 2">
+            <a:extLst>
+              <a:ext uri="{FF2B5EF4-FFF2-40B4-BE49-F238E27FC236}">
+                <a16:creationId xmlns:a16="http://schemas.microsoft.com/office/drawing/2014/main" id="{4EF2B063-3914-46F2-9763-B3341F3BB5C8}"/>
+              </a:ext>
+            </a:extLst>
+          </p:cNvPr>
+          <p:cNvSpPr>
+            <a:spLocks noGrp="1"/>
+          </p:cNvSpPr>
+          <p:nvPr>
+            <p:ph idx="1"/>
+          </p:nvPr>
+        </p:nvSpPr>
+        <p:spPr/>
+        <p:txBody>
+          <a:bodyPr/>
+          <a:lstStyle/>
+          <a:p>
+            <a:r>
+              <a:rPr lang="en-US" dirty="0"/>
+              <a:t>Create module from template</a:t>
+            </a:r>
+          </a:p>
+          <a:p>
+            <a:r>
+              <a:rPr lang="en-US" dirty="0"/>
+              <a:t>Implement the user process</a:t>
+            </a:r>
+          </a:p>
+          <a:p>
+            <a:r>
+              <a:rPr lang="en-US" dirty="0"/>
+              <a:t>Test the user process</a:t>
+            </a:r>
+          </a:p>
+          <a:p>
+            <a:endParaRPr lang="en-US" dirty="0"/>
+          </a:p>
+          <a:p>
+            <a:endParaRPr lang="en-US" dirty="0"/>
+          </a:p>
+          <a:p>
+            <a:endParaRPr lang="en-US" dirty="0"/>
+          </a:p>
+          <a:p>
+            <a:endParaRPr lang="en-US" dirty="0"/>
+          </a:p>
+          <a:p>
+            <a:endParaRPr lang="en-US" dirty="0"/>
+          </a:p>
+          <a:p>
+            <a:endParaRPr lang="en-US" dirty="0"/>
+          </a:p>
+        </p:txBody>
+      </p:sp>
+    </p:spTree>
+    <p:extLst>
+      <p:ext uri="{BB962C8B-B14F-4D97-AF65-F5344CB8AC3E}">
+        <p14:creationId xmlns:p14="http://schemas.microsoft.com/office/powerpoint/2010/main" val="3960476722"/>
+      </p:ext>
+    </p:extLst>
+  </p:cSld>
+  <p:clrMapOvr>
+    <a:masterClrMapping/>
+  </p:clrMapOvr>
+</p:sld>
+</file>
+
+<file path=ppt/slides/slide14.xml><?xml version="1.0" encoding="utf-8"?>
+<p:sld xmlns:a="http://schemas.openxmlformats.org/drawingml/2006/main" xmlns:r="http://schemas.openxmlformats.org/officeDocument/2006/relationships" xmlns:p="http://schemas.openxmlformats.org/presentationml/2006/main">
+  <p:cSld>
+    <p:spTree>
+      <p:nvGrpSpPr>
+        <p:cNvPr id="1" name=""/>
+        <p:cNvGrpSpPr/>
+        <p:nvPr/>
+      </p:nvGrpSpPr>
+      <p:grpSpPr>
+        <a:xfrm>
+          <a:off x="0" y="0"/>
+          <a:ext cx="0" cy="0"/>
+          <a:chOff x="0" y="0"/>
+          <a:chExt cx="0" cy="0"/>
+        </a:xfrm>
+      </p:grpSpPr>
+      <p:sp>
+        <p:nvSpPr>
           <p:cNvPr id="3" name="Title 2">
             <a:extLst>
               <a:ext uri="{FF2B5EF4-FFF2-40B4-BE49-F238E27FC236}">
@@ -10695,7 +10765,7 @@
 </p:sld>
 </file>
 
-<file path=ppt/slides/slide14.xml><?xml version="1.0" encoding="utf-8"?>
+<file path=ppt/slides/slide15.xml><?xml version="1.0" encoding="utf-8"?>
 <p:sld xmlns:a="http://schemas.openxmlformats.org/drawingml/2006/main" xmlns:r="http://schemas.openxmlformats.org/officeDocument/2006/relationships" xmlns:p="http://schemas.openxmlformats.org/presentationml/2006/main">
   <p:cSld>
     <p:spTree>
@@ -10821,7 +10891,7 @@
 </p:sld>
 </file>
 
-<file path=ppt/slides/slide15.xml><?xml version="1.0" encoding="utf-8"?>
+<file path=ppt/slides/slide16.xml><?xml version="1.0" encoding="utf-8"?>
 <p:sld xmlns:a="http://schemas.openxmlformats.org/drawingml/2006/main" xmlns:r="http://schemas.openxmlformats.org/officeDocument/2006/relationships" xmlns:p="http://schemas.openxmlformats.org/presentationml/2006/main">
   <p:cSld>
     <p:spTree>
@@ -11427,7 +11497,7 @@
 </p:sld>
 </file>
 
-<file path=ppt/slides/slide16.xml><?xml version="1.0" encoding="utf-8"?>
+<file path=ppt/slides/slide17.xml><?xml version="1.0" encoding="utf-8"?>
 <p:sld xmlns:a="http://schemas.openxmlformats.org/drawingml/2006/main" xmlns:r="http://schemas.openxmlformats.org/officeDocument/2006/relationships" xmlns:p="http://schemas.openxmlformats.org/presentationml/2006/main">
   <p:cSld>
     <p:spTree>
@@ -11491,7 +11561,603 @@
 </p:sld>
 </file>
 
-<file path=ppt/slides/slide17.xml><?xml version="1.0" encoding="utf-8"?>
+<file path=ppt/slides/slide18.xml><?xml version="1.0" encoding="utf-8"?>
+<p:sld xmlns:a="http://schemas.openxmlformats.org/drawingml/2006/main" xmlns:r="http://schemas.openxmlformats.org/officeDocument/2006/relationships" xmlns:p="http://schemas.openxmlformats.org/presentationml/2006/main">
+  <p:cSld>
+    <p:spTree>
+      <p:nvGrpSpPr>
+        <p:cNvPr id="1" name=""/>
+        <p:cNvGrpSpPr/>
+        <p:nvPr/>
+      </p:nvGrpSpPr>
+      <p:grpSpPr>
+        <a:xfrm>
+          <a:off x="0" y="0"/>
+          <a:ext cx="0" cy="0"/>
+          <a:chOff x="0" y="0"/>
+          <a:chExt cx="0" cy="0"/>
+        </a:xfrm>
+      </p:grpSpPr>
+      <p:sp>
+        <p:nvSpPr>
+          <p:cNvPr id="2" name="Title 1">
+            <a:extLst>
+              <a:ext uri="{FF2B5EF4-FFF2-40B4-BE49-F238E27FC236}">
+                <a16:creationId xmlns:a16="http://schemas.microsoft.com/office/drawing/2014/main" id="{F77F9243-7F60-48A5-8580-6BC70CC45E94}"/>
+              </a:ext>
+            </a:extLst>
+          </p:cNvPr>
+          <p:cNvSpPr>
+            <a:spLocks noGrp="1"/>
+          </p:cNvSpPr>
+          <p:nvPr>
+            <p:ph type="title"/>
+          </p:nvPr>
+        </p:nvSpPr>
+        <p:spPr>
+          <a:xfrm>
+            <a:off x="605367" y="365760"/>
+            <a:ext cx="10972800" cy="609600"/>
+          </a:xfrm>
+        </p:spPr>
+        <p:txBody>
+          <a:bodyPr/>
+          <a:lstStyle/>
+          <a:p>
+            <a:r>
+              <a:rPr lang="en-US" dirty="0"/>
+              <a:t>Exercise 2: Channel Scripting</a:t>
+            </a:r>
+          </a:p>
+        </p:txBody>
+      </p:sp>
+      <p:sp>
+        <p:nvSpPr>
+          <p:cNvPr id="3" name="Content Placeholder 2">
+            <a:extLst>
+              <a:ext uri="{FF2B5EF4-FFF2-40B4-BE49-F238E27FC236}">
+                <a16:creationId xmlns:a16="http://schemas.microsoft.com/office/drawing/2014/main" id="{4EF2B063-3914-46F2-9763-B3341F3BB5C8}"/>
+              </a:ext>
+            </a:extLst>
+          </p:cNvPr>
+          <p:cNvSpPr>
+            <a:spLocks noGrp="1"/>
+          </p:cNvSpPr>
+          <p:nvPr>
+            <p:ph idx="1"/>
+          </p:nvPr>
+        </p:nvSpPr>
+        <p:spPr/>
+        <p:txBody>
+          <a:bodyPr/>
+          <a:lstStyle/>
+          <a:p>
+            <a:r>
+              <a:rPr lang="en-US" dirty="0"/>
+              <a:t>Update the clusters</a:t>
+            </a:r>
+          </a:p>
+          <a:p>
+            <a:r>
+              <a:rPr lang="en-US" dirty="0"/>
+              <a:t>Run the script</a:t>
+            </a:r>
+          </a:p>
+          <a:p>
+            <a:endParaRPr lang="en-US" dirty="0"/>
+          </a:p>
+          <a:p>
+            <a:endParaRPr lang="en-US" dirty="0"/>
+          </a:p>
+          <a:p>
+            <a:endParaRPr lang="en-US" dirty="0"/>
+          </a:p>
+          <a:p>
+            <a:endParaRPr lang="en-US" dirty="0"/>
+          </a:p>
+          <a:p>
+            <a:endParaRPr lang="en-US" dirty="0"/>
+          </a:p>
+          <a:p>
+            <a:endParaRPr lang="en-US" dirty="0"/>
+          </a:p>
+        </p:txBody>
+      </p:sp>
+      <p:graphicFrame>
+        <p:nvGraphicFramePr>
+          <p:cNvPr id="7" name="Table 6">
+            <a:extLst>
+              <a:ext uri="{FF2B5EF4-FFF2-40B4-BE49-F238E27FC236}">
+                <a16:creationId xmlns:a16="http://schemas.microsoft.com/office/drawing/2014/main" id="{07DAF20D-D9C4-4254-81A3-6C5FC74918B2}"/>
+              </a:ext>
+            </a:extLst>
+          </p:cNvPr>
+          <p:cNvGraphicFramePr>
+            <a:graphicFrameLocks noGrp="1"/>
+          </p:cNvGraphicFramePr>
+          <p:nvPr>
+            <p:extLst>
+              <p:ext uri="{D42A27DB-BD31-4B8C-83A1-F6EECF244321}">
+                <p14:modId xmlns:p14="http://schemas.microsoft.com/office/powerpoint/2010/main" val="979094180"/>
+              </p:ext>
+            </p:extLst>
+          </p:nvPr>
+        </p:nvGraphicFramePr>
+        <p:xfrm>
+          <a:off x="852693" y="1892118"/>
+          <a:ext cx="8796813" cy="3200400"/>
+        </p:xfrm>
+        <a:graphic>
+          <a:graphicData uri="http://schemas.openxmlformats.org/drawingml/2006/table">
+            <a:tbl>
+              <a:tblPr firstRow="1" bandRow="1">
+                <a:tableStyleId>{5C22544A-7EE6-4342-B048-85BDC9FD1C3A}</a:tableStyleId>
+              </a:tblPr>
+              <a:tblGrid>
+                <a:gridCol w="2932271">
+                  <a:extLst>
+                    <a:ext uri="{9D8B030D-6E8A-4147-A177-3AD203B41FA5}">
+                      <a16:colId xmlns:a16="http://schemas.microsoft.com/office/drawing/2014/main" val="3145892095"/>
+                    </a:ext>
+                  </a:extLst>
+                </a:gridCol>
+                <a:gridCol w="2932271">
+                  <a:extLst>
+                    <a:ext uri="{9D8B030D-6E8A-4147-A177-3AD203B41FA5}">
+                      <a16:colId xmlns:a16="http://schemas.microsoft.com/office/drawing/2014/main" val="3750683195"/>
+                    </a:ext>
+                  </a:extLst>
+                </a:gridCol>
+                <a:gridCol w="2932271">
+                  <a:extLst>
+                    <a:ext uri="{9D8B030D-6E8A-4147-A177-3AD203B41FA5}">
+                      <a16:colId xmlns:a16="http://schemas.microsoft.com/office/drawing/2014/main" val="893307150"/>
+                    </a:ext>
+                  </a:extLst>
+                </a:gridCol>
+              </a:tblGrid>
+              <a:tr h="370840">
+                <a:tc>
+                  <a:txBody>
+                    <a:bodyPr/>
+                    <a:lstStyle/>
+                    <a:p>
+                      <a:r>
+                        <a:rPr lang="en-US" dirty="0"/>
+                        <a:t>Channel</a:t>
+                      </a:r>
+                    </a:p>
+                  </a:txBody>
+                  <a:tcPr/>
+                </a:tc>
+                <a:tc>
+                  <a:txBody>
+                    <a:bodyPr/>
+                    <a:lstStyle/>
+                    <a:p>
+                      <a:r>
+                        <a:rPr lang="en-US" dirty="0"/>
+                        <a:t>Data Type</a:t>
+                      </a:r>
+                    </a:p>
+                  </a:txBody>
+                  <a:tcPr/>
+                </a:tc>
+                <a:tc>
+                  <a:txBody>
+                    <a:bodyPr/>
+                    <a:lstStyle/>
+                    <a:p>
+                      <a:r>
+                        <a:rPr lang="en-US" dirty="0"/>
+                        <a:t>Channel Type</a:t>
+                      </a:r>
+                    </a:p>
+                  </a:txBody>
+                  <a:tcPr/>
+                </a:tc>
+                <a:extLst>
+                  <a:ext uri="{0D108BD9-81ED-4DB2-BD59-A6C34878D82A}">
+                    <a16:rowId xmlns:a16="http://schemas.microsoft.com/office/drawing/2014/main" val="1003854384"/>
+                  </a:ext>
+                </a:extLst>
+              </a:tr>
+              <a:tr h="370840">
+                <a:tc>
+                  <a:txBody>
+                    <a:bodyPr/>
+                    <a:lstStyle/>
+                    <a:p>
+                      <a:pPr marL="0" marR="0" lvl="0" indent="0" algn="l" defTabSz="1219170" rtl="0" eaLnBrk="1" fontAlgn="auto" latinLnBrk="0" hangingPunct="1">
+                        <a:lnSpc>
+                          <a:spcPct val="100000"/>
+                        </a:lnSpc>
+                        <a:spcBef>
+                          <a:spcPts val="0"/>
+                        </a:spcBef>
+                        <a:spcAft>
+                          <a:spcPts val="0"/>
+                        </a:spcAft>
+                        <a:buClrTx/>
+                        <a:buSzTx/>
+                        <a:buFontTx/>
+                        <a:buNone/>
+                        <a:tabLst/>
+                        <a:defRPr/>
+                      </a:pPr>
+                      <a:r>
+                        <a:rPr lang="en-US" dirty="0"/>
+                        <a:t>Variable</a:t>
+                      </a:r>
+                    </a:p>
+                  </a:txBody>
+                  <a:tcPr/>
+                </a:tc>
+                <a:tc>
+                  <a:txBody>
+                    <a:bodyPr/>
+                    <a:lstStyle/>
+                    <a:p>
+                      <a:r>
+                        <a:rPr lang="en-US" dirty="0"/>
+                        <a:t>Double</a:t>
+                      </a:r>
+                    </a:p>
+                  </a:txBody>
+                  <a:tcPr/>
+                </a:tc>
+                <a:tc>
+                  <a:txBody>
+                    <a:bodyPr/>
+                    <a:lstStyle/>
+                    <a:p>
+                      <a:r>
+                        <a:rPr lang="en-US" dirty="0"/>
+                        <a:t>Process Parameter</a:t>
+                      </a:r>
+                    </a:p>
+                  </a:txBody>
+                  <a:tcPr/>
+                </a:tc>
+                <a:extLst>
+                  <a:ext uri="{0D108BD9-81ED-4DB2-BD59-A6C34878D82A}">
+                    <a16:rowId xmlns:a16="http://schemas.microsoft.com/office/drawing/2014/main" val="2507582932"/>
+                  </a:ext>
+                </a:extLst>
+              </a:tr>
+              <a:tr h="370840">
+                <a:tc>
+                  <a:txBody>
+                    <a:bodyPr/>
+                    <a:lstStyle/>
+                    <a:p>
+                      <a:r>
+                        <a:rPr lang="en-US" dirty="0"/>
+                        <a:t>Setpoint</a:t>
+                      </a:r>
+                    </a:p>
+                  </a:txBody>
+                  <a:tcPr/>
+                </a:tc>
+                <a:tc>
+                  <a:txBody>
+                    <a:bodyPr/>
+                    <a:lstStyle/>
+                    <a:p>
+                      <a:r>
+                        <a:rPr lang="en-US" dirty="0"/>
+                        <a:t>Double</a:t>
+                      </a:r>
+                    </a:p>
+                  </a:txBody>
+                  <a:tcPr/>
+                </a:tc>
+                <a:tc>
+                  <a:txBody>
+                    <a:bodyPr/>
+                    <a:lstStyle/>
+                    <a:p>
+                      <a:pPr marL="0" marR="0" lvl="0" indent="0" algn="l" defTabSz="1219170" rtl="0" eaLnBrk="1" fontAlgn="auto" latinLnBrk="0" hangingPunct="1">
+                        <a:lnSpc>
+                          <a:spcPct val="100000"/>
+                        </a:lnSpc>
+                        <a:spcBef>
+                          <a:spcPts val="0"/>
+                        </a:spcBef>
+                        <a:spcAft>
+                          <a:spcPts val="0"/>
+                        </a:spcAft>
+                        <a:buClrTx/>
+                        <a:buSzTx/>
+                        <a:buFontTx/>
+                        <a:buNone/>
+                        <a:tabLst/>
+                        <a:defRPr/>
+                      </a:pPr>
+                      <a:r>
+                        <a:rPr lang="en-US" dirty="0"/>
+                        <a:t>Process Parameter</a:t>
+                      </a:r>
+                    </a:p>
+                  </a:txBody>
+                  <a:tcPr/>
+                </a:tc>
+                <a:extLst>
+                  <a:ext uri="{0D108BD9-81ED-4DB2-BD59-A6C34878D82A}">
+                    <a16:rowId xmlns:a16="http://schemas.microsoft.com/office/drawing/2014/main" val="3110449280"/>
+                  </a:ext>
+                </a:extLst>
+              </a:tr>
+              <a:tr h="370840">
+                <a:tc>
+                  <a:txBody>
+                    <a:bodyPr/>
+                    <a:lstStyle/>
+                    <a:p>
+                      <a:r>
+                        <a:rPr lang="en-US" dirty="0"/>
+                        <a:t>Output</a:t>
+                      </a:r>
+                    </a:p>
+                  </a:txBody>
+                  <a:tcPr/>
+                </a:tc>
+                <a:tc>
+                  <a:txBody>
+                    <a:bodyPr/>
+                    <a:lstStyle/>
+                    <a:p>
+                      <a:r>
+                        <a:rPr lang="en-US" dirty="0"/>
+                        <a:t>Double</a:t>
+                      </a:r>
+                    </a:p>
+                  </a:txBody>
+                  <a:tcPr/>
+                </a:tc>
+                <a:tc>
+                  <a:txBody>
+                    <a:bodyPr/>
+                    <a:lstStyle/>
+                    <a:p>
+                      <a:r>
+                        <a:rPr lang="en-US" dirty="0"/>
+                        <a:t>Result</a:t>
+                      </a:r>
+                    </a:p>
+                  </a:txBody>
+                  <a:tcPr/>
+                </a:tc>
+                <a:extLst>
+                  <a:ext uri="{0D108BD9-81ED-4DB2-BD59-A6C34878D82A}">
+                    <a16:rowId xmlns:a16="http://schemas.microsoft.com/office/drawing/2014/main" val="1709584318"/>
+                  </a:ext>
+                </a:extLst>
+              </a:tr>
+              <a:tr h="370840">
+                <a:tc>
+                  <a:txBody>
+                    <a:bodyPr/>
+                    <a:lstStyle/>
+                    <a:p>
+                      <a:r>
+                        <a:rPr lang="en-US" dirty="0"/>
+                        <a:t>P</a:t>
+                      </a:r>
+                    </a:p>
+                  </a:txBody>
+                  <a:tcPr/>
+                </a:tc>
+                <a:tc>
+                  <a:txBody>
+                    <a:bodyPr/>
+                    <a:lstStyle/>
+                    <a:p>
+                      <a:pPr marL="0" marR="0" lvl="0" indent="0" algn="l" defTabSz="1219170" rtl="0" eaLnBrk="1" fontAlgn="auto" latinLnBrk="0" hangingPunct="1">
+                        <a:lnSpc>
+                          <a:spcPct val="100000"/>
+                        </a:lnSpc>
+                        <a:spcBef>
+                          <a:spcPts val="0"/>
+                        </a:spcBef>
+                        <a:spcAft>
+                          <a:spcPts val="0"/>
+                        </a:spcAft>
+                        <a:buClrTx/>
+                        <a:buSzTx/>
+                        <a:buFontTx/>
+                        <a:buNone/>
+                        <a:tabLst/>
+                        <a:defRPr/>
+                      </a:pPr>
+                      <a:r>
+                        <a:rPr lang="en-US" dirty="0"/>
+                        <a:t>Double</a:t>
+                      </a:r>
+                    </a:p>
+                  </a:txBody>
+                  <a:tcPr/>
+                </a:tc>
+                <a:tc>
+                  <a:txBody>
+                    <a:bodyPr/>
+                    <a:lstStyle/>
+                    <a:p>
+                      <a:pPr marL="0" marR="0" lvl="0" indent="0" algn="l" defTabSz="1219170" rtl="0" eaLnBrk="1" fontAlgn="auto" latinLnBrk="0" hangingPunct="1">
+                        <a:lnSpc>
+                          <a:spcPct val="100000"/>
+                        </a:lnSpc>
+                        <a:spcBef>
+                          <a:spcPts val="0"/>
+                        </a:spcBef>
+                        <a:spcAft>
+                          <a:spcPts val="0"/>
+                        </a:spcAft>
+                        <a:buClrTx/>
+                        <a:buSzTx/>
+                        <a:buFontTx/>
+                        <a:buNone/>
+                        <a:tabLst/>
+                        <a:defRPr/>
+                      </a:pPr>
+                      <a:r>
+                        <a:rPr lang="en-US" dirty="0"/>
+                        <a:t>Process Parameter</a:t>
+                      </a:r>
+                    </a:p>
+                  </a:txBody>
+                  <a:tcPr/>
+                </a:tc>
+                <a:extLst>
+                  <a:ext uri="{0D108BD9-81ED-4DB2-BD59-A6C34878D82A}">
+                    <a16:rowId xmlns:a16="http://schemas.microsoft.com/office/drawing/2014/main" val="2150168525"/>
+                  </a:ext>
+                </a:extLst>
+              </a:tr>
+              <a:tr h="370840">
+                <a:tc>
+                  <a:txBody>
+                    <a:bodyPr/>
+                    <a:lstStyle/>
+                    <a:p>
+                      <a:r>
+                        <a:rPr lang="en-US" dirty="0"/>
+                        <a:t>I</a:t>
+                      </a:r>
+                    </a:p>
+                  </a:txBody>
+                  <a:tcPr/>
+                </a:tc>
+                <a:tc>
+                  <a:txBody>
+                    <a:bodyPr/>
+                    <a:lstStyle/>
+                    <a:p>
+                      <a:r>
+                        <a:rPr lang="en-US" dirty="0"/>
+                        <a:t>Double</a:t>
+                      </a:r>
+                    </a:p>
+                  </a:txBody>
+                  <a:tcPr/>
+                </a:tc>
+                <a:tc>
+                  <a:txBody>
+                    <a:bodyPr/>
+                    <a:lstStyle/>
+                    <a:p>
+                      <a:pPr marL="0" marR="0" lvl="0" indent="0" algn="l" defTabSz="1219170" rtl="0" eaLnBrk="1" fontAlgn="auto" latinLnBrk="0" hangingPunct="1">
+                        <a:lnSpc>
+                          <a:spcPct val="100000"/>
+                        </a:lnSpc>
+                        <a:spcBef>
+                          <a:spcPts val="0"/>
+                        </a:spcBef>
+                        <a:spcAft>
+                          <a:spcPts val="0"/>
+                        </a:spcAft>
+                        <a:buClrTx/>
+                        <a:buSzTx/>
+                        <a:buFontTx/>
+                        <a:buNone/>
+                        <a:tabLst/>
+                        <a:defRPr/>
+                      </a:pPr>
+                      <a:r>
+                        <a:rPr lang="en-US" dirty="0"/>
+                        <a:t>Process Parameter</a:t>
+                      </a:r>
+                    </a:p>
+                  </a:txBody>
+                  <a:tcPr/>
+                </a:tc>
+                <a:extLst>
+                  <a:ext uri="{0D108BD9-81ED-4DB2-BD59-A6C34878D82A}">
+                    <a16:rowId xmlns:a16="http://schemas.microsoft.com/office/drawing/2014/main" val="2537519005"/>
+                  </a:ext>
+                </a:extLst>
+              </a:tr>
+              <a:tr h="370840">
+                <a:tc>
+                  <a:txBody>
+                    <a:bodyPr/>
+                    <a:lstStyle/>
+                    <a:p>
+                      <a:r>
+                        <a:rPr lang="en-US" dirty="0"/>
+                        <a:t>D</a:t>
+                      </a:r>
+                    </a:p>
+                  </a:txBody>
+                  <a:tcPr/>
+                </a:tc>
+                <a:tc>
+                  <a:txBody>
+                    <a:bodyPr/>
+                    <a:lstStyle/>
+                    <a:p>
+                      <a:r>
+                        <a:rPr lang="en-US" dirty="0"/>
+                        <a:t>Double</a:t>
+                      </a:r>
+                    </a:p>
+                  </a:txBody>
+                  <a:tcPr/>
+                </a:tc>
+                <a:tc>
+                  <a:txBody>
+                    <a:bodyPr/>
+                    <a:lstStyle/>
+                    <a:p>
+                      <a:pPr marL="0" marR="0" lvl="0" indent="0" algn="l" defTabSz="1219170" rtl="0" eaLnBrk="1" fontAlgn="auto" latinLnBrk="0" hangingPunct="1">
+                        <a:lnSpc>
+                          <a:spcPct val="100000"/>
+                        </a:lnSpc>
+                        <a:spcBef>
+                          <a:spcPts val="0"/>
+                        </a:spcBef>
+                        <a:spcAft>
+                          <a:spcPts val="0"/>
+                        </a:spcAft>
+                        <a:buClrTx/>
+                        <a:buSzTx/>
+                        <a:buFontTx/>
+                        <a:buNone/>
+                        <a:tabLst/>
+                        <a:defRPr/>
+                      </a:pPr>
+                      <a:r>
+                        <a:rPr lang="en-US" dirty="0"/>
+                        <a:t>Process Parameter</a:t>
+                      </a:r>
+                    </a:p>
+                  </a:txBody>
+                  <a:tcPr/>
+                </a:tc>
+                <a:extLst>
+                  <a:ext uri="{0D108BD9-81ED-4DB2-BD59-A6C34878D82A}">
+                    <a16:rowId xmlns:a16="http://schemas.microsoft.com/office/drawing/2014/main" val="1383414657"/>
+                  </a:ext>
+                </a:extLst>
+              </a:tr>
+            </a:tbl>
+          </a:graphicData>
+        </a:graphic>
+      </p:graphicFrame>
+    </p:spTree>
+    <p:extLst>
+      <p:ext uri="{BB962C8B-B14F-4D97-AF65-F5344CB8AC3E}">
+        <p14:creationId xmlns:p14="http://schemas.microsoft.com/office/powerpoint/2010/main" val="1969058261"/>
+      </p:ext>
+    </p:extLst>
+  </p:cSld>
+  <p:clrMapOvr>
+    <a:masterClrMapping/>
+  </p:clrMapOvr>
+</p:sld>
+</file>
+
+<file path=ppt/slides/slide19.xml><?xml version="1.0" encoding="utf-8"?>
 <p:sld xmlns:a="http://schemas.openxmlformats.org/drawingml/2006/main" xmlns:r="http://schemas.openxmlformats.org/officeDocument/2006/relationships" xmlns:p="http://schemas.openxmlformats.org/presentationml/2006/main">
   <p:cSld>
     <p:spTree>
@@ -11695,7 +12361,7 @@
           <a:lstStyle/>
           <a:p>
             <a:pPr algn="ctr"/>
-            <a:endParaRPr lang="en-US"/>
+            <a:endParaRPr lang="en-US" dirty="0"/>
           </a:p>
         </p:txBody>
       </p:sp>
@@ -11749,7 +12415,7 @@
           <a:lstStyle/>
           <a:p>
             <a:pPr algn="ctr"/>
-            <a:endParaRPr lang="en-US"/>
+            <a:endParaRPr lang="en-US" dirty="0"/>
           </a:p>
         </p:txBody>
       </p:sp>
@@ -11766,7 +12432,123 @@
 </p:sld>
 </file>
 
-<file path=ppt/slides/slide18.xml><?xml version="1.0" encoding="utf-8"?>
+<file path=ppt/slides/slide2.xml><?xml version="1.0" encoding="utf-8"?>
+<p:sld xmlns:a="http://schemas.openxmlformats.org/drawingml/2006/main" xmlns:r="http://schemas.openxmlformats.org/officeDocument/2006/relationships" xmlns:p="http://schemas.openxmlformats.org/presentationml/2006/main">
+  <p:cSld>
+    <p:spTree>
+      <p:nvGrpSpPr>
+        <p:cNvPr id="1" name=""/>
+        <p:cNvGrpSpPr/>
+        <p:nvPr/>
+      </p:nvGrpSpPr>
+      <p:grpSpPr>
+        <a:xfrm>
+          <a:off x="0" y="0"/>
+          <a:ext cx="0" cy="0"/>
+          <a:chOff x="0" y="0"/>
+          <a:chExt cx="0" cy="0"/>
+        </a:xfrm>
+      </p:grpSpPr>
+      <p:sp>
+        <p:nvSpPr>
+          <p:cNvPr id="2" name="Title 1">
+            <a:extLst>
+              <a:ext uri="{FF2B5EF4-FFF2-40B4-BE49-F238E27FC236}">
+                <a16:creationId xmlns:a16="http://schemas.microsoft.com/office/drawing/2014/main" id="{B8BDC128-5203-4FD3-9016-F27C562930D2}"/>
+              </a:ext>
+            </a:extLst>
+          </p:cNvPr>
+          <p:cNvSpPr>
+            <a:spLocks noGrp="1"/>
+          </p:cNvSpPr>
+          <p:nvPr>
+            <p:ph type="title"/>
+          </p:nvPr>
+        </p:nvSpPr>
+        <p:spPr/>
+        <p:txBody>
+          <a:bodyPr/>
+          <a:lstStyle/>
+          <a:p>
+            <a:r>
+              <a:rPr lang="en-US" dirty="0"/>
+              <a:t>Agenda</a:t>
+            </a:r>
+          </a:p>
+        </p:txBody>
+      </p:sp>
+      <p:sp>
+        <p:nvSpPr>
+          <p:cNvPr id="3" name="Content Placeholder 2">
+            <a:extLst>
+              <a:ext uri="{FF2B5EF4-FFF2-40B4-BE49-F238E27FC236}">
+                <a16:creationId xmlns:a16="http://schemas.microsoft.com/office/drawing/2014/main" id="{78F1A5E9-65F0-4886-8010-57C400974AF3}"/>
+              </a:ext>
+            </a:extLst>
+          </p:cNvPr>
+          <p:cNvSpPr>
+            <a:spLocks noGrp="1"/>
+          </p:cNvSpPr>
+          <p:nvPr>
+            <p:ph idx="1"/>
+          </p:nvPr>
+        </p:nvSpPr>
+        <p:spPr/>
+        <p:txBody>
+          <a:bodyPr/>
+          <a:lstStyle/>
+          <a:p>
+            <a:r>
+              <a:rPr lang="en-US" dirty="0"/>
+              <a:t>What Template to use</a:t>
+            </a:r>
+          </a:p>
+          <a:p>
+            <a:r>
+              <a:rPr lang="en-US" dirty="0"/>
+              <a:t>Static Module Creation</a:t>
+            </a:r>
+          </a:p>
+          <a:p>
+            <a:r>
+              <a:rPr lang="en-US" dirty="0"/>
+              <a:t>Script include</a:t>
+            </a:r>
+          </a:p>
+          <a:p>
+            <a:r>
+              <a:rPr lang="en-US" dirty="0"/>
+              <a:t>Parameters</a:t>
+            </a:r>
+          </a:p>
+          <a:p>
+            <a:r>
+              <a:rPr lang="en-US" dirty="0"/>
+              <a:t>Initialization</a:t>
+            </a:r>
+          </a:p>
+          <a:p>
+            <a:endParaRPr lang="en-US" dirty="0"/>
+          </a:p>
+          <a:p>
+            <a:endParaRPr lang="en-US" dirty="0"/>
+          </a:p>
+        </p:txBody>
+      </p:sp>
+    </p:spTree>
+    <p:extLst>
+      <p:ext uri="{BB962C8B-B14F-4D97-AF65-F5344CB8AC3E}">
+        <p14:creationId xmlns:p14="http://schemas.microsoft.com/office/powerpoint/2010/main" val="1801139919"/>
+      </p:ext>
+    </p:extLst>
+  </p:cSld>
+  <p:clrMapOvr>
+    <a:masterClrMapping/>
+  </p:clrMapOvr>
+</p:sld>
+</file>
+
+<file path=ppt/slides/slide20.xml><?xml version="1.0" encoding="utf-8"?>
 <p:sld xmlns:a="http://schemas.openxmlformats.org/drawingml/2006/main" xmlns:r="http://schemas.openxmlformats.org/officeDocument/2006/relationships" xmlns:p="http://schemas.openxmlformats.org/presentationml/2006/main">
   <p:cSld>
     <p:spTree>
@@ -11886,7 +12668,7 @@
 </p:sld>
 </file>
 
-<file path=ppt/slides/slide19.xml><?xml version="1.0" encoding="utf-8"?>
+<file path=ppt/slides/slide21.xml><?xml version="1.0" encoding="utf-8"?>
 <p:sld xmlns:a="http://schemas.openxmlformats.org/drawingml/2006/main" xmlns:r="http://schemas.openxmlformats.org/officeDocument/2006/relationships" xmlns:p="http://schemas.openxmlformats.org/presentationml/2006/main">
   <p:cSld>
     <p:spTree>
@@ -12052,123 +12834,7 @@
 </p:sld>
 </file>
 
-<file path=ppt/slides/slide2.xml><?xml version="1.0" encoding="utf-8"?>
-<p:sld xmlns:a="http://schemas.openxmlformats.org/drawingml/2006/main" xmlns:r="http://schemas.openxmlformats.org/officeDocument/2006/relationships" xmlns:p="http://schemas.openxmlformats.org/presentationml/2006/main">
-  <p:cSld>
-    <p:spTree>
-      <p:nvGrpSpPr>
-        <p:cNvPr id="1" name=""/>
-        <p:cNvGrpSpPr/>
-        <p:nvPr/>
-      </p:nvGrpSpPr>
-      <p:grpSpPr>
-        <a:xfrm>
-          <a:off x="0" y="0"/>
-          <a:ext cx="0" cy="0"/>
-          <a:chOff x="0" y="0"/>
-          <a:chExt cx="0" cy="0"/>
-        </a:xfrm>
-      </p:grpSpPr>
-      <p:sp>
-        <p:nvSpPr>
-          <p:cNvPr id="2" name="Title 1">
-            <a:extLst>
-              <a:ext uri="{FF2B5EF4-FFF2-40B4-BE49-F238E27FC236}">
-                <a16:creationId xmlns:a16="http://schemas.microsoft.com/office/drawing/2014/main" id="{B8BDC128-5203-4FD3-9016-F27C562930D2}"/>
-              </a:ext>
-            </a:extLst>
-          </p:cNvPr>
-          <p:cNvSpPr>
-            <a:spLocks noGrp="1"/>
-          </p:cNvSpPr>
-          <p:nvPr>
-            <p:ph type="title"/>
-          </p:nvPr>
-        </p:nvSpPr>
-        <p:spPr/>
-        <p:txBody>
-          <a:bodyPr/>
-          <a:lstStyle/>
-          <a:p>
-            <a:r>
-              <a:rPr lang="en-US" dirty="0"/>
-              <a:t>Agenda</a:t>
-            </a:r>
-          </a:p>
-        </p:txBody>
-      </p:sp>
-      <p:sp>
-        <p:nvSpPr>
-          <p:cNvPr id="3" name="Content Placeholder 2">
-            <a:extLst>
-              <a:ext uri="{FF2B5EF4-FFF2-40B4-BE49-F238E27FC236}">
-                <a16:creationId xmlns:a16="http://schemas.microsoft.com/office/drawing/2014/main" id="{78F1A5E9-65F0-4886-8010-57C400974AF3}"/>
-              </a:ext>
-            </a:extLst>
-          </p:cNvPr>
-          <p:cNvSpPr>
-            <a:spLocks noGrp="1"/>
-          </p:cNvSpPr>
-          <p:nvPr>
-            <p:ph idx="1"/>
-          </p:nvPr>
-        </p:nvSpPr>
-        <p:spPr/>
-        <p:txBody>
-          <a:bodyPr/>
-          <a:lstStyle/>
-          <a:p>
-            <a:r>
-              <a:rPr lang="en-US" dirty="0"/>
-              <a:t>What Template to use</a:t>
-            </a:r>
-          </a:p>
-          <a:p>
-            <a:r>
-              <a:rPr lang="en-US" dirty="0"/>
-              <a:t>Static Module Creation</a:t>
-            </a:r>
-          </a:p>
-          <a:p>
-            <a:r>
-              <a:rPr lang="en-US" dirty="0"/>
-              <a:t>Script include</a:t>
-            </a:r>
-          </a:p>
-          <a:p>
-            <a:r>
-              <a:rPr lang="en-US" dirty="0"/>
-              <a:t>Parameters</a:t>
-            </a:r>
-          </a:p>
-          <a:p>
-            <a:r>
-              <a:rPr lang="en-US" dirty="0"/>
-              <a:t>Initialization</a:t>
-            </a:r>
-          </a:p>
-          <a:p>
-            <a:endParaRPr lang="en-US" dirty="0"/>
-          </a:p>
-          <a:p>
-            <a:endParaRPr lang="en-US" dirty="0"/>
-          </a:p>
-        </p:txBody>
-      </p:sp>
-    </p:spTree>
-    <p:extLst>
-      <p:ext uri="{BB962C8B-B14F-4D97-AF65-F5344CB8AC3E}">
-        <p14:creationId xmlns:p14="http://schemas.microsoft.com/office/powerpoint/2010/main" val="1801139919"/>
-      </p:ext>
-    </p:extLst>
-  </p:cSld>
-  <p:clrMapOvr>
-    <a:masterClrMapping/>
-  </p:clrMapOvr>
-</p:sld>
-</file>
-
-<file path=ppt/slides/slide20.xml><?xml version="1.0" encoding="utf-8"?>
+<file path=ppt/slides/slide22.xml><?xml version="1.0" encoding="utf-8"?>
 <p:sld xmlns:a="http://schemas.openxmlformats.org/drawingml/2006/main" xmlns:r="http://schemas.openxmlformats.org/officeDocument/2006/relationships" xmlns:p="http://schemas.openxmlformats.org/presentationml/2006/main">
   <p:cSld>
     <p:spTree>
@@ -12226,7 +12892,140 @@
 </p:sld>
 </file>
 
-<file path=ppt/slides/slide21.xml><?xml version="1.0" encoding="utf-8"?>
+<file path=ppt/slides/slide23.xml><?xml version="1.0" encoding="utf-8"?>
+<p:sld xmlns:a="http://schemas.openxmlformats.org/drawingml/2006/main" xmlns:r="http://schemas.openxmlformats.org/officeDocument/2006/relationships" xmlns:p="http://schemas.openxmlformats.org/presentationml/2006/main">
+  <p:cSld>
+    <p:spTree>
+      <p:nvGrpSpPr>
+        <p:cNvPr id="1" name=""/>
+        <p:cNvGrpSpPr/>
+        <p:nvPr/>
+      </p:nvGrpSpPr>
+      <p:grpSpPr>
+        <a:xfrm>
+          <a:off x="0" y="0"/>
+          <a:ext cx="0" cy="0"/>
+          <a:chOff x="0" y="0"/>
+          <a:chExt cx="0" cy="0"/>
+        </a:xfrm>
+      </p:grpSpPr>
+      <p:sp>
+        <p:nvSpPr>
+          <p:cNvPr id="2" name="Title 1">
+            <a:extLst>
+              <a:ext uri="{FF2B5EF4-FFF2-40B4-BE49-F238E27FC236}">
+                <a16:creationId xmlns:a16="http://schemas.microsoft.com/office/drawing/2014/main" id="{F77F9243-7F60-48A5-8580-6BC70CC45E94}"/>
+              </a:ext>
+            </a:extLst>
+          </p:cNvPr>
+          <p:cNvSpPr>
+            <a:spLocks noGrp="1"/>
+          </p:cNvSpPr>
+          <p:nvPr>
+            <p:ph type="title"/>
+          </p:nvPr>
+        </p:nvSpPr>
+        <p:spPr>
+          <a:xfrm>
+            <a:off x="605367" y="365760"/>
+            <a:ext cx="10972800" cy="609600"/>
+          </a:xfrm>
+        </p:spPr>
+        <p:txBody>
+          <a:bodyPr/>
+          <a:lstStyle/>
+          <a:p>
+            <a:r>
+              <a:rPr lang="en-US" dirty="0"/>
+              <a:t>Exercise 3: State Machine</a:t>
+            </a:r>
+          </a:p>
+        </p:txBody>
+      </p:sp>
+      <p:sp>
+        <p:nvSpPr>
+          <p:cNvPr id="3" name="Content Placeholder 2">
+            <a:extLst>
+              <a:ext uri="{FF2B5EF4-FFF2-40B4-BE49-F238E27FC236}">
+                <a16:creationId xmlns:a16="http://schemas.microsoft.com/office/drawing/2014/main" id="{4EF2B063-3914-46F2-9763-B3341F3BB5C8}"/>
+              </a:ext>
+            </a:extLst>
+          </p:cNvPr>
+          <p:cNvSpPr>
+            <a:spLocks noGrp="1"/>
+          </p:cNvSpPr>
+          <p:nvPr>
+            <p:ph idx="1"/>
+          </p:nvPr>
+        </p:nvSpPr>
+        <p:spPr/>
+        <p:txBody>
+          <a:bodyPr/>
+          <a:lstStyle/>
+          <a:p>
+            <a:r>
+              <a:rPr lang="en-US" dirty="0"/>
+              <a:t>Create module from template</a:t>
+            </a:r>
+          </a:p>
+          <a:p>
+            <a:r>
+              <a:rPr lang="en-US" dirty="0"/>
+              <a:t>Add the state to the runtime</a:t>
+            </a:r>
+          </a:p>
+          <a:p>
+            <a:r>
+              <a:rPr lang="en-US" dirty="0"/>
+              <a:t>Initialize the state</a:t>
+            </a:r>
+          </a:p>
+          <a:p>
+            <a:r>
+              <a:rPr lang="en-US" dirty="0"/>
+              <a:t>Implement the user process</a:t>
+            </a:r>
+          </a:p>
+          <a:p>
+            <a:r>
+              <a:rPr lang="en-US" dirty="0"/>
+              <a:t>Test the user process</a:t>
+            </a:r>
+          </a:p>
+          <a:p>
+            <a:endParaRPr lang="en-US" dirty="0"/>
+          </a:p>
+          <a:p>
+            <a:endParaRPr lang="en-US" dirty="0"/>
+          </a:p>
+          <a:p>
+            <a:endParaRPr lang="en-US" dirty="0"/>
+          </a:p>
+          <a:p>
+            <a:endParaRPr lang="en-US" dirty="0"/>
+          </a:p>
+          <a:p>
+            <a:endParaRPr lang="en-US" dirty="0"/>
+          </a:p>
+          <a:p>
+            <a:endParaRPr lang="en-US" dirty="0"/>
+          </a:p>
+        </p:txBody>
+      </p:sp>
+    </p:spTree>
+    <p:extLst>
+      <p:ext uri="{BB962C8B-B14F-4D97-AF65-F5344CB8AC3E}">
+        <p14:creationId xmlns:p14="http://schemas.microsoft.com/office/powerpoint/2010/main" val="3220196452"/>
+      </p:ext>
+    </p:extLst>
+  </p:cSld>
+  <p:clrMapOvr>
+    <a:masterClrMapping/>
+  </p:clrMapOvr>
+</p:sld>
+</file>
+
+<file path=ppt/slides/slide24.xml><?xml version="1.0" encoding="utf-8"?>
 <p:sld xmlns:a="http://schemas.openxmlformats.org/drawingml/2006/main" xmlns:r="http://schemas.openxmlformats.org/officeDocument/2006/relationships" xmlns:p="http://schemas.openxmlformats.org/presentationml/2006/main">
   <p:cSld>
     <p:spTree>
@@ -12272,7 +13071,7 @@
           <a:p>
             <a:r>
               <a:rPr lang="en-US" dirty="0"/>
-              <a:t>Run the state machine in DCAF.</a:t>
+              <a:t>Running the state machine in DCAF Engine</a:t>
             </a:r>
           </a:p>
         </p:txBody>
@@ -12290,7 +13089,108 @@
 </p:sld>
 </file>
 
-<file path=ppt/slides/slide22.xml><?xml version="1.0" encoding="utf-8"?>
+<file path=ppt/slides/slide25.xml><?xml version="1.0" encoding="utf-8"?>
+<p:sld xmlns:a="http://schemas.openxmlformats.org/drawingml/2006/main" xmlns:r="http://schemas.openxmlformats.org/officeDocument/2006/relationships" xmlns:p="http://schemas.openxmlformats.org/presentationml/2006/main">
+  <p:cSld>
+    <p:spTree>
+      <p:nvGrpSpPr>
+        <p:cNvPr id="1" name=""/>
+        <p:cNvGrpSpPr/>
+        <p:nvPr/>
+      </p:nvGrpSpPr>
+      <p:grpSpPr>
+        <a:xfrm>
+          <a:off x="0" y="0"/>
+          <a:ext cx="0" cy="0"/>
+          <a:chOff x="0" y="0"/>
+          <a:chExt cx="0" cy="0"/>
+        </a:xfrm>
+      </p:grpSpPr>
+      <p:sp>
+        <p:nvSpPr>
+          <p:cNvPr id="2" name="Title 1">
+            <a:extLst>
+              <a:ext uri="{FF2B5EF4-FFF2-40B4-BE49-F238E27FC236}">
+                <a16:creationId xmlns:a16="http://schemas.microsoft.com/office/drawing/2014/main" id="{F77F9243-7F60-48A5-8580-6BC70CC45E94}"/>
+              </a:ext>
+            </a:extLst>
+          </p:cNvPr>
+          <p:cNvSpPr>
+            <a:spLocks noGrp="1"/>
+          </p:cNvSpPr>
+          <p:nvPr>
+            <p:ph type="title"/>
+          </p:nvPr>
+        </p:nvSpPr>
+        <p:spPr/>
+        <p:txBody>
+          <a:bodyPr/>
+          <a:lstStyle/>
+          <a:p>
+            <a:r>
+              <a:rPr lang="en-US" dirty="0"/>
+              <a:t>Exercise 4: Running the state machine in DCAF Engine</a:t>
+            </a:r>
+          </a:p>
+        </p:txBody>
+      </p:sp>
+      <p:sp>
+        <p:nvSpPr>
+          <p:cNvPr id="3" name="Content Placeholder 2">
+            <a:extLst>
+              <a:ext uri="{FF2B5EF4-FFF2-40B4-BE49-F238E27FC236}">
+                <a16:creationId xmlns:a16="http://schemas.microsoft.com/office/drawing/2014/main" id="{4EF2B063-3914-46F2-9763-B3341F3BB5C8}"/>
+              </a:ext>
+            </a:extLst>
+          </p:cNvPr>
+          <p:cNvSpPr>
+            <a:spLocks noGrp="1"/>
+          </p:cNvSpPr>
+          <p:nvPr>
+            <p:ph idx="1"/>
+          </p:nvPr>
+        </p:nvSpPr>
+        <p:spPr/>
+        <p:txBody>
+          <a:bodyPr/>
+          <a:lstStyle/>
+          <a:p>
+            <a:r>
+              <a:rPr lang="en-US" dirty="0"/>
+              <a:t>Use the UI module to test 2 multiplexers in the runtime</a:t>
+            </a:r>
+          </a:p>
+          <a:p>
+            <a:endParaRPr lang="en-US" dirty="0"/>
+          </a:p>
+          <a:p>
+            <a:endParaRPr lang="en-US" dirty="0"/>
+          </a:p>
+          <a:p>
+            <a:endParaRPr lang="en-US" dirty="0"/>
+          </a:p>
+          <a:p>
+            <a:endParaRPr lang="en-US" dirty="0"/>
+          </a:p>
+          <a:p>
+            <a:endParaRPr lang="en-US" dirty="0"/>
+          </a:p>
+        </p:txBody>
+      </p:sp>
+    </p:spTree>
+    <p:extLst>
+      <p:ext uri="{BB962C8B-B14F-4D97-AF65-F5344CB8AC3E}">
+        <p14:creationId xmlns:p14="http://schemas.microsoft.com/office/powerpoint/2010/main" val="2297590106"/>
+      </p:ext>
+    </p:extLst>
+  </p:cSld>
+  <p:clrMapOvr>
+    <a:masterClrMapping/>
+  </p:clrMapOvr>
+</p:sld>
+</file>
+
+<file path=ppt/slides/slide26.xml><?xml version="1.0" encoding="utf-8"?>
 <p:sld xmlns:a="http://schemas.openxmlformats.org/drawingml/2006/main" xmlns:r="http://schemas.openxmlformats.org/officeDocument/2006/relationships" xmlns:p="http://schemas.openxmlformats.org/presentationml/2006/main">
   <p:cSld>
     <p:spTree>
@@ -12356,7 +13256,7 @@
             <a:pPr lvl="2"/>
             <a:r>
               <a:rPr lang="en-US" dirty="0"/>
-              <a:t>Create the Module from the Static Module Sample Project</a:t>
+              <a:t>Create the Module from the Static Module</a:t>
             </a:r>
           </a:p>
           <a:p>
@@ -12659,15 +13559,7 @@
             </a:pPr>
             <a:r>
               <a:rPr lang="en-US" dirty="0"/>
-              <a:t>More </a:t>
-            </a:r>
-            <a:r>
-              <a:rPr lang="en-US" dirty="0" err="1"/>
-              <a:t>cmmonly</a:t>
-            </a:r>
-            <a:r>
-              <a:rPr lang="en-US" dirty="0"/>
-              <a:t> used for input/output</a:t>
+              <a:t>More commonly used for input/output</a:t>
             </a:r>
           </a:p>
         </p:txBody>
@@ -13453,7 +14345,7 @@
           <a:lstStyle/>
           <a:p>
             <a:pPr algn="ctr"/>
-            <a:endParaRPr lang="en-US"/>
+            <a:endParaRPr lang="en-US" dirty="0"/>
           </a:p>
         </p:txBody>
       </p:sp>
@@ -13510,7 +14402,7 @@
           <a:lstStyle/>
           <a:p>
             <a:pPr algn="ctr"/>
-            <a:endParaRPr lang="en-US"/>
+            <a:endParaRPr lang="en-US" dirty="0"/>
           </a:p>
         </p:txBody>
       </p:sp>
@@ -13567,7 +14459,7 @@
           <a:lstStyle/>
           <a:p>
             <a:pPr algn="ctr"/>
-            <a:endParaRPr lang="en-US"/>
+            <a:endParaRPr lang="en-US" dirty="0"/>
           </a:p>
         </p:txBody>
       </p:sp>
@@ -13624,7 +14516,7 @@
           <a:lstStyle/>
           <a:p>
             <a:pPr algn="ctr"/>
-            <a:endParaRPr lang="en-US"/>
+            <a:endParaRPr lang="en-US" dirty="0"/>
           </a:p>
         </p:txBody>
       </p:sp>
@@ -13857,7 +14749,7 @@
           <a:lstStyle/>
           <a:p>
             <a:pPr algn="ctr"/>
-            <a:endParaRPr lang="en-US"/>
+            <a:endParaRPr lang="en-US" dirty="0"/>
           </a:p>
         </p:txBody>
       </p:sp>
@@ -13916,7 +14808,7 @@
           <a:lstStyle/>
           <a:p>
             <a:pPr algn="ctr"/>
-            <a:endParaRPr lang="en-US"/>
+            <a:endParaRPr lang="en-US" dirty="0"/>
           </a:p>
         </p:txBody>
       </p:sp>
@@ -13975,7 +14867,7 @@
           <a:lstStyle/>
           <a:p>
             <a:pPr algn="ctr"/>
-            <a:endParaRPr lang="en-US"/>
+            <a:endParaRPr lang="en-US" dirty="0"/>
           </a:p>
         </p:txBody>
       </p:sp>
@@ -14034,7 +14926,7 @@
           <a:lstStyle/>
           <a:p>
             <a:pPr algn="ctr"/>
-            <a:endParaRPr lang="en-US"/>
+            <a:endParaRPr lang="en-US" dirty="0"/>
           </a:p>
         </p:txBody>
       </p:sp>
@@ -14126,50 +15018,23 @@
           <a:p>
             <a:pPr lvl="2"/>
             <a:r>
-              <a:rPr lang="en-US" dirty="0" err="1"/>
-              <a:t>ModuleName</a:t>
-            </a:r>
-            <a:r>
-              <a:rPr lang="en-US" dirty="0"/>
-              <a:t> </a:t>
-            </a:r>
-            <a:r>
-              <a:rPr lang="en-US" dirty="0" err="1"/>
-              <a:t>configuration.lvlclass</a:t>
-            </a:r>
-            <a:endParaRPr lang="en-US" dirty="0"/>
+              <a:rPr lang="en-US" dirty="0"/>
+              <a:t>ModuleName configuration.lvlclass</a:t>
+            </a:r>
           </a:p>
           <a:p>
             <a:pPr lvl="2"/>
             <a:r>
-              <a:rPr lang="en-US" dirty="0" err="1"/>
-              <a:t>ModuleName</a:t>
-            </a:r>
-            <a:r>
-              <a:rPr lang="en-US" dirty="0"/>
-              <a:t> </a:t>
-            </a:r>
-            <a:r>
-              <a:rPr lang="en-US" dirty="0" err="1"/>
-              <a:t>editor.lvlclass</a:t>
-            </a:r>
-            <a:endParaRPr lang="en-US" dirty="0"/>
+              <a:rPr lang="en-US" dirty="0"/>
+              <a:t>ModuleName editor.lvlclass</a:t>
+            </a:r>
           </a:p>
           <a:p>
             <a:pPr lvl="2"/>
             <a:r>
-              <a:rPr lang="en-US" dirty="0" err="1"/>
-              <a:t>ModuleName</a:t>
-            </a:r>
-            <a:r>
-              <a:rPr lang="en-US" dirty="0"/>
-              <a:t> </a:t>
-            </a:r>
-            <a:r>
-              <a:rPr lang="en-US" dirty="0" err="1"/>
-              <a:t>runtime.lvlclass</a:t>
-            </a:r>
-            <a:endParaRPr lang="en-US" dirty="0"/>
+              <a:rPr lang="en-US" dirty="0"/>
+              <a:t>ModuleName runtime.lvlclass</a:t>
+            </a:r>
           </a:p>
           <a:p>
             <a:pPr lvl="2"/>

</xml_diff>

<commit_message>
Updated the graph on the slide it was showign a dynamic module
</commit_message>
<xml_diff>
--- a/Trunk/Getting Started Material/DCAF Training/6 Static Modules.pptx
+++ b/Trunk/Getting Started Material/DCAF Training/6 Static Modules.pptx
@@ -2896,7 +2896,7 @@
           <a:p>
             <a:fld id="{EA1FD1DD-1EDF-4341-AE12-9015BA74AB77}" type="datetimeFigureOut">
               <a:rPr lang="en-US" smtClean="0"/>
-              <a:t>7/9/2018</a:t>
+              <a:t>7/16/2018</a:t>
             </a:fld>
             <a:endParaRPr lang="en-US" dirty="0"/>
           </a:p>
@@ -6615,7 +6615,7 @@
           <a:p>
             <a:fld id="{C328AB28-8CF8-4FDA-851D-B8A8B08C8597}" type="datetimeFigureOut">
               <a:rPr lang="en-US" smtClean="0"/>
-              <a:t>7/9/2018</a:t>
+              <a:t>7/16/2018</a:t>
             </a:fld>
             <a:endParaRPr lang="en-US" dirty="0"/>
           </a:p>
@@ -13622,38 +13622,6 @@
           </a:p>
         </p:txBody>
       </p:sp>
-      <p:pic>
-        <p:nvPicPr>
-          <p:cNvPr id="94" name="Content Placeholder 93">
-            <a:extLst>
-              <a:ext uri="{FF2B5EF4-FFF2-40B4-BE49-F238E27FC236}">
-                <a16:creationId xmlns:a16="http://schemas.microsoft.com/office/drawing/2014/main" id="{23734373-74A0-46BF-9FDF-1840EE7D0C29}"/>
-              </a:ext>
-            </a:extLst>
-          </p:cNvPr>
-          <p:cNvPicPr>
-            <a:picLocks noGrp="1" noChangeAspect="1"/>
-          </p:cNvPicPr>
-          <p:nvPr>
-            <p:ph sz="half" idx="1"/>
-          </p:nvPr>
-        </p:nvPicPr>
-        <p:blipFill>
-          <a:blip r:embed="rId2"/>
-          <a:stretch>
-            <a:fillRect/>
-          </a:stretch>
-        </p:blipFill>
-        <p:spPr>
-          <a:xfrm>
-            <a:off x="311352" y="1489843"/>
-            <a:ext cx="5389562" cy="4265641"/>
-          </a:xfrm>
-          <a:prstGeom prst="rect">
-            <a:avLst/>
-          </a:prstGeom>
-        </p:spPr>
-      </p:pic>
       <p:sp>
         <p:nvSpPr>
           <p:cNvPr id="96" name="Rounded Rectangle 5">
@@ -14930,6 +14898,41 @@
           </a:p>
         </p:txBody>
       </p:sp>
+      <p:pic>
+        <p:nvPicPr>
+          <p:cNvPr id="28" name="Content Placeholder 4">
+            <a:extLst>
+              <a:ext uri="{FF2B5EF4-FFF2-40B4-BE49-F238E27FC236}">
+                <a16:creationId xmlns:a16="http://schemas.microsoft.com/office/drawing/2014/main" id="{EECA9D48-DC9F-4754-AAE8-619D11A3B379}"/>
+              </a:ext>
+            </a:extLst>
+          </p:cNvPr>
+          <p:cNvPicPr>
+            <a:picLocks noGrp="1" noChangeAspect="1"/>
+          </p:cNvPicPr>
+          <p:nvPr>
+            <p:ph sz="half" idx="1"/>
+          </p:nvPr>
+        </p:nvPicPr>
+        <p:blipFill>
+          <a:blip r:embed="rId2">
+            <a:extLst>
+              <a:ext uri="{28A0092B-C50C-407E-A947-70E740481C1C}">
+                <a14:useLocalDpi xmlns:a14="http://schemas.microsoft.com/office/drawing/2010/main" val="0"/>
+              </a:ext>
+            </a:extLst>
+          </a:blip>
+          <a:stretch>
+            <a:fillRect/>
+          </a:stretch>
+        </p:blipFill>
+        <p:spPr>
+          <a:xfrm>
+            <a:off x="604838" y="1806360"/>
+            <a:ext cx="4946850" cy="3886811"/>
+          </a:xfrm>
+        </p:spPr>
+      </p:pic>
     </p:spTree>
     <p:extLst>
       <p:ext uri="{BB962C8B-B14F-4D97-AF65-F5344CB8AC3E}">

</xml_diff>

<commit_message>
Improvements and coments during class
</commit_message>
<xml_diff>
--- a/Trunk/Getting Started Material/DCAF Training/6 Static Modules.pptx
+++ b/Trunk/Getting Started Material/DCAF Training/6 Static Modules.pptx
@@ -2896,7 +2896,7 @@
           <a:p>
             <a:fld id="{EA1FD1DD-1EDF-4341-AE12-9015BA74AB77}" type="datetimeFigureOut">
               <a:rPr lang="en-US" smtClean="0"/>
-              <a:t>2018-07-10</a:t>
+              <a:t>7/17/2018</a:t>
             </a:fld>
             <a:endParaRPr lang="en-US" dirty="0"/>
           </a:p>
@@ -6615,7 +6615,7 @@
           <a:p>
             <a:fld id="{C328AB28-8CF8-4FDA-851D-B8A8B08C8597}" type="datetimeFigureOut">
               <a:rPr lang="en-US" smtClean="0"/>
-              <a:t>2018-07-10</a:t>
+              <a:t>7/17/2018</a:t>
             </a:fld>
             <a:endParaRPr lang="en-US" dirty="0"/>
           </a:p>
@@ -10629,6 +10629,355 @@
           </a:p>
         </p:txBody>
       </p:sp>
+      <p:graphicFrame>
+        <p:nvGraphicFramePr>
+          <p:cNvPr id="4" name="Table 3">
+            <a:extLst>
+              <a:ext uri="{FF2B5EF4-FFF2-40B4-BE49-F238E27FC236}">
+                <a16:creationId xmlns:a16="http://schemas.microsoft.com/office/drawing/2014/main" id="{FCEF47CB-282C-4193-A839-85FA2CE1196D}"/>
+              </a:ext>
+            </a:extLst>
+          </p:cNvPr>
+          <p:cNvGraphicFramePr>
+            <a:graphicFrameLocks noGrp="1"/>
+          </p:cNvGraphicFramePr>
+          <p:nvPr>
+            <p:extLst>
+              <p:ext uri="{D42A27DB-BD31-4B8C-83A1-F6EECF244321}">
+                <p14:modId xmlns:p14="http://schemas.microsoft.com/office/powerpoint/2010/main" val="2713087040"/>
+              </p:ext>
+            </p:extLst>
+          </p:nvPr>
+        </p:nvGraphicFramePr>
+        <p:xfrm>
+          <a:off x="1222940" y="2643833"/>
+          <a:ext cx="8796813" cy="2743200"/>
+        </p:xfrm>
+        <a:graphic>
+          <a:graphicData uri="http://schemas.openxmlformats.org/drawingml/2006/table">
+            <a:tbl>
+              <a:tblPr firstRow="1" bandRow="1">
+                <a:tableStyleId>{5C22544A-7EE6-4342-B048-85BDC9FD1C3A}</a:tableStyleId>
+              </a:tblPr>
+              <a:tblGrid>
+                <a:gridCol w="2932271">
+                  <a:extLst>
+                    <a:ext uri="{9D8B030D-6E8A-4147-A177-3AD203B41FA5}">
+                      <a16:colId xmlns:a16="http://schemas.microsoft.com/office/drawing/2014/main" val="3145892095"/>
+                    </a:ext>
+                  </a:extLst>
+                </a:gridCol>
+                <a:gridCol w="2932271">
+                  <a:extLst>
+                    <a:ext uri="{9D8B030D-6E8A-4147-A177-3AD203B41FA5}">
+                      <a16:colId xmlns:a16="http://schemas.microsoft.com/office/drawing/2014/main" val="3750683195"/>
+                    </a:ext>
+                  </a:extLst>
+                </a:gridCol>
+                <a:gridCol w="2932271">
+                  <a:extLst>
+                    <a:ext uri="{9D8B030D-6E8A-4147-A177-3AD203B41FA5}">
+                      <a16:colId xmlns:a16="http://schemas.microsoft.com/office/drawing/2014/main" val="893307150"/>
+                    </a:ext>
+                  </a:extLst>
+                </a:gridCol>
+              </a:tblGrid>
+              <a:tr h="370840">
+                <a:tc>
+                  <a:txBody>
+                    <a:bodyPr/>
+                    <a:lstStyle/>
+                    <a:p>
+                      <a:r>
+                        <a:rPr lang="en-US" dirty="0"/>
+                        <a:t>Channel</a:t>
+                      </a:r>
+                    </a:p>
+                  </a:txBody>
+                  <a:tcPr/>
+                </a:tc>
+                <a:tc>
+                  <a:txBody>
+                    <a:bodyPr/>
+                    <a:lstStyle/>
+                    <a:p>
+                      <a:r>
+                        <a:rPr lang="en-US" dirty="0"/>
+                        <a:t>Data Type</a:t>
+                      </a:r>
+                    </a:p>
+                  </a:txBody>
+                  <a:tcPr/>
+                </a:tc>
+                <a:tc>
+                  <a:txBody>
+                    <a:bodyPr/>
+                    <a:lstStyle/>
+                    <a:p>
+                      <a:r>
+                        <a:rPr lang="en-US" dirty="0"/>
+                        <a:t>Channel Type</a:t>
+                      </a:r>
+                    </a:p>
+                  </a:txBody>
+                  <a:tcPr/>
+                </a:tc>
+                <a:extLst>
+                  <a:ext uri="{0D108BD9-81ED-4DB2-BD59-A6C34878D82A}">
+                    <a16:rowId xmlns:a16="http://schemas.microsoft.com/office/drawing/2014/main" val="1003854384"/>
+                  </a:ext>
+                </a:extLst>
+              </a:tr>
+              <a:tr h="370840">
+                <a:tc>
+                  <a:txBody>
+                    <a:bodyPr/>
+                    <a:lstStyle/>
+                    <a:p>
+                      <a:pPr marL="0" marR="0" lvl="0" indent="0" algn="l" defTabSz="1219170" rtl="0" eaLnBrk="1" fontAlgn="auto" latinLnBrk="0" hangingPunct="1">
+                        <a:lnSpc>
+                          <a:spcPct val="100000"/>
+                        </a:lnSpc>
+                        <a:spcBef>
+                          <a:spcPts val="0"/>
+                        </a:spcBef>
+                        <a:spcAft>
+                          <a:spcPts val="0"/>
+                        </a:spcAft>
+                        <a:buClrTx/>
+                        <a:buSzTx/>
+                        <a:buFontTx/>
+                        <a:buNone/>
+                        <a:tabLst/>
+                        <a:defRPr/>
+                      </a:pPr>
+                      <a:r>
+                        <a:rPr lang="en-US" dirty="0"/>
+                        <a:t>Variable</a:t>
+                      </a:r>
+                    </a:p>
+                  </a:txBody>
+                  <a:tcPr/>
+                </a:tc>
+                <a:tc>
+                  <a:txBody>
+                    <a:bodyPr/>
+                    <a:lstStyle/>
+                    <a:p>
+                      <a:r>
+                        <a:rPr lang="en-US" dirty="0"/>
+                        <a:t>Double</a:t>
+                      </a:r>
+                    </a:p>
+                  </a:txBody>
+                  <a:tcPr/>
+                </a:tc>
+                <a:tc>
+                  <a:txBody>
+                    <a:bodyPr/>
+                    <a:lstStyle/>
+                    <a:p>
+                      <a:r>
+                        <a:rPr lang="en-US" dirty="0"/>
+                        <a:t>Process Parameter</a:t>
+                      </a:r>
+                    </a:p>
+                  </a:txBody>
+                  <a:tcPr/>
+                </a:tc>
+                <a:extLst>
+                  <a:ext uri="{0D108BD9-81ED-4DB2-BD59-A6C34878D82A}">
+                    <a16:rowId xmlns:a16="http://schemas.microsoft.com/office/drawing/2014/main" val="2507582932"/>
+                  </a:ext>
+                </a:extLst>
+              </a:tr>
+              <a:tr h="370840">
+                <a:tc>
+                  <a:txBody>
+                    <a:bodyPr/>
+                    <a:lstStyle/>
+                    <a:p>
+                      <a:r>
+                        <a:rPr lang="en-US" dirty="0"/>
+                        <a:t>Setpoint</a:t>
+                      </a:r>
+                    </a:p>
+                  </a:txBody>
+                  <a:tcPr/>
+                </a:tc>
+                <a:tc>
+                  <a:txBody>
+                    <a:bodyPr/>
+                    <a:lstStyle/>
+                    <a:p>
+                      <a:r>
+                        <a:rPr lang="en-US" dirty="0"/>
+                        <a:t>Double</a:t>
+                      </a:r>
+                    </a:p>
+                  </a:txBody>
+                  <a:tcPr/>
+                </a:tc>
+                <a:tc>
+                  <a:txBody>
+                    <a:bodyPr/>
+                    <a:lstStyle/>
+                    <a:p>
+                      <a:pPr marL="0" marR="0" lvl="0" indent="0" algn="l" defTabSz="1219170" rtl="0" eaLnBrk="1" fontAlgn="auto" latinLnBrk="0" hangingPunct="1">
+                        <a:lnSpc>
+                          <a:spcPct val="100000"/>
+                        </a:lnSpc>
+                        <a:spcBef>
+                          <a:spcPts val="0"/>
+                        </a:spcBef>
+                        <a:spcAft>
+                          <a:spcPts val="0"/>
+                        </a:spcAft>
+                        <a:buClrTx/>
+                        <a:buSzTx/>
+                        <a:buFontTx/>
+                        <a:buNone/>
+                        <a:tabLst/>
+                        <a:defRPr/>
+                      </a:pPr>
+                      <a:r>
+                        <a:rPr lang="en-US" dirty="0"/>
+                        <a:t>Process Parameter</a:t>
+                      </a:r>
+                    </a:p>
+                  </a:txBody>
+                  <a:tcPr/>
+                </a:tc>
+                <a:extLst>
+                  <a:ext uri="{0D108BD9-81ED-4DB2-BD59-A6C34878D82A}">
+                    <a16:rowId xmlns:a16="http://schemas.microsoft.com/office/drawing/2014/main" val="3110449280"/>
+                  </a:ext>
+                </a:extLst>
+              </a:tr>
+              <a:tr h="370840">
+                <a:tc>
+                  <a:txBody>
+                    <a:bodyPr/>
+                    <a:lstStyle/>
+                    <a:p>
+                      <a:r>
+                        <a:rPr lang="en-US" dirty="0"/>
+                        <a:t>Output</a:t>
+                      </a:r>
+                    </a:p>
+                  </a:txBody>
+                  <a:tcPr/>
+                </a:tc>
+                <a:tc>
+                  <a:txBody>
+                    <a:bodyPr/>
+                    <a:lstStyle/>
+                    <a:p>
+                      <a:r>
+                        <a:rPr lang="en-US" dirty="0"/>
+                        <a:t>Double</a:t>
+                      </a:r>
+                    </a:p>
+                  </a:txBody>
+                  <a:tcPr/>
+                </a:tc>
+                <a:tc>
+                  <a:txBody>
+                    <a:bodyPr/>
+                    <a:lstStyle/>
+                    <a:p>
+                      <a:r>
+                        <a:rPr lang="en-US" dirty="0"/>
+                        <a:t>Result</a:t>
+                      </a:r>
+                    </a:p>
+                  </a:txBody>
+                  <a:tcPr/>
+                </a:tc>
+                <a:extLst>
+                  <a:ext uri="{0D108BD9-81ED-4DB2-BD59-A6C34878D82A}">
+                    <a16:rowId xmlns:a16="http://schemas.microsoft.com/office/drawing/2014/main" val="1709584318"/>
+                  </a:ext>
+                </a:extLst>
+              </a:tr>
+              <a:tr h="370840">
+                <a:tc>
+                  <a:txBody>
+                    <a:bodyPr/>
+                    <a:lstStyle/>
+                    <a:p>
+                      <a:endParaRPr lang="en-US" dirty="0"/>
+                    </a:p>
+                  </a:txBody>
+                  <a:tcPr/>
+                </a:tc>
+                <a:tc>
+                  <a:txBody>
+                    <a:bodyPr/>
+                    <a:lstStyle/>
+                    <a:p>
+                      <a:endParaRPr lang="en-US" dirty="0"/>
+                    </a:p>
+                  </a:txBody>
+                  <a:tcPr/>
+                </a:tc>
+                <a:tc>
+                  <a:txBody>
+                    <a:bodyPr/>
+                    <a:lstStyle/>
+                    <a:p>
+                      <a:endParaRPr lang="en-US" dirty="0"/>
+                    </a:p>
+                  </a:txBody>
+                  <a:tcPr/>
+                </a:tc>
+                <a:extLst>
+                  <a:ext uri="{0D108BD9-81ED-4DB2-BD59-A6C34878D82A}">
+                    <a16:rowId xmlns:a16="http://schemas.microsoft.com/office/drawing/2014/main" val="2150168525"/>
+                  </a:ext>
+                </a:extLst>
+              </a:tr>
+              <a:tr h="370840">
+                <a:tc>
+                  <a:txBody>
+                    <a:bodyPr/>
+                    <a:lstStyle/>
+                    <a:p>
+                      <a:endParaRPr lang="en-US" dirty="0"/>
+                    </a:p>
+                  </a:txBody>
+                  <a:tcPr/>
+                </a:tc>
+                <a:tc>
+                  <a:txBody>
+                    <a:bodyPr/>
+                    <a:lstStyle/>
+                    <a:p>
+                      <a:endParaRPr lang="en-US" dirty="0"/>
+                    </a:p>
+                  </a:txBody>
+                  <a:tcPr/>
+                </a:tc>
+                <a:tc>
+                  <a:txBody>
+                    <a:bodyPr/>
+                    <a:lstStyle/>
+                    <a:p>
+                      <a:endParaRPr lang="en-US" dirty="0"/>
+                    </a:p>
+                  </a:txBody>
+                  <a:tcPr/>
+                </a:tc>
+                <a:extLst>
+                  <a:ext uri="{0D108BD9-81ED-4DB2-BD59-A6C34878D82A}">
+                    <a16:rowId xmlns:a16="http://schemas.microsoft.com/office/drawing/2014/main" val="2537519005"/>
+                  </a:ext>
+                </a:extLst>
+              </a:tr>
+            </a:tbl>
+          </a:graphicData>
+        </a:graphic>
+      </p:graphicFrame>
     </p:spTree>
     <p:extLst>
       <p:ext uri="{BB962C8B-B14F-4D97-AF65-F5344CB8AC3E}">
@@ -13622,38 +13971,6 @@
           </a:p>
         </p:txBody>
       </p:sp>
-      <p:pic>
-        <p:nvPicPr>
-          <p:cNvPr id="94" name="Content Placeholder 93">
-            <a:extLst>
-              <a:ext uri="{FF2B5EF4-FFF2-40B4-BE49-F238E27FC236}">
-                <a16:creationId xmlns:a16="http://schemas.microsoft.com/office/drawing/2014/main" id="{23734373-74A0-46BF-9FDF-1840EE7D0C29}"/>
-              </a:ext>
-            </a:extLst>
-          </p:cNvPr>
-          <p:cNvPicPr>
-            <a:picLocks noGrp="1" noChangeAspect="1"/>
-          </p:cNvPicPr>
-          <p:nvPr>
-            <p:ph sz="half" idx="1"/>
-          </p:nvPr>
-        </p:nvPicPr>
-        <p:blipFill>
-          <a:blip r:embed="rId2"/>
-          <a:stretch>
-            <a:fillRect/>
-          </a:stretch>
-        </p:blipFill>
-        <p:spPr>
-          <a:xfrm>
-            <a:off x="311352" y="1489843"/>
-            <a:ext cx="5389562" cy="4265641"/>
-          </a:xfrm>
-          <a:prstGeom prst="rect">
-            <a:avLst/>
-          </a:prstGeom>
-        </p:spPr>
-      </p:pic>
       <p:sp>
         <p:nvSpPr>
           <p:cNvPr id="96" name="Rounded Rectangle 5">
@@ -14930,6 +15247,41 @@
           </a:p>
         </p:txBody>
       </p:sp>
+      <p:pic>
+        <p:nvPicPr>
+          <p:cNvPr id="27" name="Content Placeholder 4">
+            <a:extLst>
+              <a:ext uri="{FF2B5EF4-FFF2-40B4-BE49-F238E27FC236}">
+                <a16:creationId xmlns:a16="http://schemas.microsoft.com/office/drawing/2014/main" id="{46A40DDC-161C-4A63-9A9A-0016632F3E04}"/>
+              </a:ext>
+            </a:extLst>
+          </p:cNvPr>
+          <p:cNvPicPr>
+            <a:picLocks noGrp="1" noChangeAspect="1"/>
+          </p:cNvPicPr>
+          <p:nvPr>
+            <p:ph sz="half" idx="1"/>
+          </p:nvPr>
+        </p:nvPicPr>
+        <p:blipFill>
+          <a:blip r:embed="rId2">
+            <a:extLst>
+              <a:ext uri="{28A0092B-C50C-407E-A947-70E740481C1C}">
+                <a14:useLocalDpi xmlns:a14="http://schemas.microsoft.com/office/drawing/2010/main" val="0"/>
+              </a:ext>
+            </a:extLst>
+          </a:blip>
+          <a:stretch>
+            <a:fillRect/>
+          </a:stretch>
+        </p:blipFill>
+        <p:spPr>
+          <a:xfrm>
+            <a:off x="466833" y="1972987"/>
+            <a:ext cx="4765040" cy="3743960"/>
+          </a:xfrm>
+        </p:spPr>
+      </p:pic>
     </p:spTree>
     <p:extLst>
       <p:ext uri="{BB962C8B-B14F-4D97-AF65-F5344CB8AC3E}">

</xml_diff>

<commit_message>
Added Hands On 3 outline. and upated slides to map to the outline. Added Excercise 2 on Hands On 2. Minor Spelling Fixes.
</commit_message>
<xml_diff>
--- a/Trunk/Getting Started Material/DCAF Training/6 Static Modules.pptx
+++ b/Trunk/Getting Started Material/DCAF Training/6 Static Modules.pptx
@@ -5,7 +5,7 @@
     <p:sldMasterId id="2147483741" r:id="rId1"/>
   </p:sldMasterIdLst>
   <p:notesMasterIdLst>
-    <p:notesMasterId r:id="rId28"/>
+    <p:notesMasterId r:id="rId27"/>
   </p:notesMasterIdLst>
   <p:sldIdLst>
     <p:sldId id="259" r:id="rId2"/>
@@ -32,8 +32,7 @@
     <p:sldId id="408" r:id="rId23"/>
     <p:sldId id="418" r:id="rId24"/>
     <p:sldId id="410" r:id="rId25"/>
-    <p:sldId id="420" r:id="rId26"/>
-    <p:sldId id="411" r:id="rId27"/>
+    <p:sldId id="411" r:id="rId26"/>
   </p:sldIdLst>
   <p:sldSz cx="12192000" cy="6858000"/>
   <p:notesSz cx="6858000" cy="9144000"/>
@@ -2896,7 +2895,7 @@
           <a:p>
             <a:fld id="{EA1FD1DD-1EDF-4341-AE12-9015BA74AB77}" type="datetimeFigureOut">
               <a:rPr lang="en-US" smtClean="0"/>
-              <a:t>7/17/2018</a:t>
+              <a:t>8/28/2018</a:t>
             </a:fld>
             <a:endParaRPr lang="en-US" dirty="0"/>
           </a:p>
@@ -6615,7 +6614,7 @@
           <a:p>
             <a:fld id="{C328AB28-8CF8-4FDA-851D-B8A8B08C8597}" type="datetimeFigureOut">
               <a:rPr lang="en-US" smtClean="0"/>
-              <a:t>7/17/2018</a:t>
+              <a:t>8/28/2018</a:t>
             </a:fld>
             <a:endParaRPr lang="en-US" dirty="0"/>
           </a:p>
@@ -10498,6 +10497,12 @@
             <a:r>
               <a:rPr lang="en-US" dirty="0"/>
               <a:t>Exercise 1 Custom PID</a:t>
+            </a:r>
+          </a:p>
+          <a:p>
+            <a:r>
+              <a:rPr lang="en-US" dirty="0"/>
+              <a:t>Hands-On 2: Exercise 1 Part A</a:t>
             </a:r>
           </a:p>
           <a:p>
@@ -11895,6 +11900,18 @@
               <a:t>Channel Scripting</a:t>
             </a:r>
           </a:p>
+          <a:p>
+            <a:r>
+              <a:rPr lang="en-US" dirty="0"/>
+              <a:t>Hands-On 2: Exercise 2 Part B</a:t>
+            </a:r>
+          </a:p>
+          <a:p>
+            <a:endParaRPr lang="en-US" dirty="0"/>
+          </a:p>
+          <a:p>
+            <a:endParaRPr lang="en-US" dirty="0"/>
+          </a:p>
         </p:txBody>
       </p:sp>
     </p:spTree>
@@ -13123,19 +13140,19 @@
           <a:p>
             <a:r>
               <a:rPr lang="en-US" dirty="0"/>
-              <a:t>To switch from 1 to 2. Only A is True</a:t>
-            </a:r>
-          </a:p>
-          <a:p>
-            <a:r>
-              <a:rPr lang="en-US" dirty="0"/>
-              <a:t>To switch form 2 to 3 Only B is True</a:t>
-            </a:r>
-          </a:p>
-          <a:p>
-            <a:r>
-              <a:rPr lang="en-US" dirty="0"/>
-              <a:t>To switch from 3 to 1 Only C is True</a:t>
+              <a:t>To change from 1 to 2. Only A is True</a:t>
+            </a:r>
+          </a:p>
+          <a:p>
+            <a:r>
+              <a:rPr lang="en-US" dirty="0"/>
+              <a:t>To change from 2 to 3. Only B is True</a:t>
+            </a:r>
+          </a:p>
+          <a:p>
+            <a:r>
+              <a:rPr lang="en-US" dirty="0"/>
+              <a:t>To change from 3 to 1. Only C is True</a:t>
             </a:r>
           </a:p>
         </p:txBody>
@@ -13226,6 +13243,12 @@
               <a:t>Exercise 3 State Machine Module</a:t>
             </a:r>
           </a:p>
+          <a:p>
+            <a:r>
+              <a:rPr lang="en-US" dirty="0"/>
+              <a:t>Hands-On 2: Exercise 2 Part A</a:t>
+            </a:r>
+          </a:p>
         </p:txBody>
       </p:sp>
     </p:spTree>
@@ -13423,6 +13446,15 @@
               <a:t>Running the state machine in DCAF Engine</a:t>
             </a:r>
           </a:p>
+          <a:p>
+            <a:r>
+              <a:rPr lang="en-US" dirty="0"/>
+              <a:t>Hands-On 2: Exercise 2 Part B</a:t>
+            </a:r>
+          </a:p>
+          <a:p>
+            <a:endParaRPr lang="en-US" dirty="0"/>
+          </a:p>
         </p:txBody>
       </p:sp>
     </p:spTree>
@@ -13439,107 +13471,6 @@
 </file>
 
 <file path=ppt/slides/slide25.xml><?xml version="1.0" encoding="utf-8"?>
-<p:sld xmlns:a="http://schemas.openxmlformats.org/drawingml/2006/main" xmlns:r="http://schemas.openxmlformats.org/officeDocument/2006/relationships" xmlns:p="http://schemas.openxmlformats.org/presentationml/2006/main">
-  <p:cSld>
-    <p:spTree>
-      <p:nvGrpSpPr>
-        <p:cNvPr id="1" name=""/>
-        <p:cNvGrpSpPr/>
-        <p:nvPr/>
-      </p:nvGrpSpPr>
-      <p:grpSpPr>
-        <a:xfrm>
-          <a:off x="0" y="0"/>
-          <a:ext cx="0" cy="0"/>
-          <a:chOff x="0" y="0"/>
-          <a:chExt cx="0" cy="0"/>
-        </a:xfrm>
-      </p:grpSpPr>
-      <p:sp>
-        <p:nvSpPr>
-          <p:cNvPr id="2" name="Title 1">
-            <a:extLst>
-              <a:ext uri="{FF2B5EF4-FFF2-40B4-BE49-F238E27FC236}">
-                <a16:creationId xmlns:a16="http://schemas.microsoft.com/office/drawing/2014/main" id="{F77F9243-7F60-48A5-8580-6BC70CC45E94}"/>
-              </a:ext>
-            </a:extLst>
-          </p:cNvPr>
-          <p:cNvSpPr>
-            <a:spLocks noGrp="1"/>
-          </p:cNvSpPr>
-          <p:nvPr>
-            <p:ph type="title"/>
-          </p:nvPr>
-        </p:nvSpPr>
-        <p:spPr/>
-        <p:txBody>
-          <a:bodyPr/>
-          <a:lstStyle/>
-          <a:p>
-            <a:r>
-              <a:rPr lang="en-US" dirty="0"/>
-              <a:t>Exercise 4: Running the state machine in DCAF Engine</a:t>
-            </a:r>
-          </a:p>
-        </p:txBody>
-      </p:sp>
-      <p:sp>
-        <p:nvSpPr>
-          <p:cNvPr id="3" name="Content Placeholder 2">
-            <a:extLst>
-              <a:ext uri="{FF2B5EF4-FFF2-40B4-BE49-F238E27FC236}">
-                <a16:creationId xmlns:a16="http://schemas.microsoft.com/office/drawing/2014/main" id="{4EF2B063-3914-46F2-9763-B3341F3BB5C8}"/>
-              </a:ext>
-            </a:extLst>
-          </p:cNvPr>
-          <p:cNvSpPr>
-            <a:spLocks noGrp="1"/>
-          </p:cNvSpPr>
-          <p:nvPr>
-            <p:ph idx="1"/>
-          </p:nvPr>
-        </p:nvSpPr>
-        <p:spPr/>
-        <p:txBody>
-          <a:bodyPr/>
-          <a:lstStyle/>
-          <a:p>
-            <a:r>
-              <a:rPr lang="en-US" dirty="0"/>
-              <a:t>Use the UI module to test 2 multiplexers in the runtime</a:t>
-            </a:r>
-          </a:p>
-          <a:p>
-            <a:endParaRPr lang="en-US" dirty="0"/>
-          </a:p>
-          <a:p>
-            <a:endParaRPr lang="en-US" dirty="0"/>
-          </a:p>
-          <a:p>
-            <a:endParaRPr lang="en-US" dirty="0"/>
-          </a:p>
-          <a:p>
-            <a:endParaRPr lang="en-US" dirty="0"/>
-          </a:p>
-          <a:p>
-            <a:endParaRPr lang="en-US" dirty="0"/>
-          </a:p>
-        </p:txBody>
-      </p:sp>
-    </p:spTree>
-    <p:extLst>
-      <p:ext uri="{BB962C8B-B14F-4D97-AF65-F5344CB8AC3E}">
-        <p14:creationId xmlns:p14="http://schemas.microsoft.com/office/powerpoint/2010/main" val="2297590106"/>
-      </p:ext>
-    </p:extLst>
-  </p:cSld>
-  <p:clrMapOvr>
-    <a:masterClrMapping/>
-  </p:clrMapOvr>
-</p:sld>
-</file>
-
-<file path=ppt/slides/slide26.xml><?xml version="1.0" encoding="utf-8"?>
 <p:sld xmlns:a="http://schemas.openxmlformats.org/drawingml/2006/main" xmlns:r="http://schemas.openxmlformats.org/officeDocument/2006/relationships" xmlns:p="http://schemas.openxmlformats.org/presentationml/2006/main">
   <p:cSld>
     <p:spTree>

</xml_diff>